<commit_message>
added logo for nxplorer babel
</commit_message>
<xml_diff>
--- a/screenshots/nxplorerjs.pptx
+++ b/screenshots/nxplorerjs.pptx
@@ -9,6 +9,7 @@
     <p:sldId id="260" r:id="rId3"/>
     <p:sldId id="257" r:id="rId4"/>
     <p:sldId id="258" r:id="rId5"/>
+    <p:sldId id="261" r:id="rId6"/>
   </p:sldIdLst>
   <p:sldSz cx="12192000" cy="6858000"/>
   <p:notesSz cx="6858000" cy="9144000"/>
@@ -246,7 +247,7 @@
           <a:p>
             <a:fld id="{DAC9CD23-5E0E-47E2-9306-97F1D7E6AA5C}" type="datetimeFigureOut">
               <a:rPr lang="en-IN" smtClean="0"/>
-              <a:t>09-03-2018</a:t>
+              <a:t>19-03-2018</a:t>
             </a:fld>
             <a:endParaRPr lang="en-IN"/>
           </a:p>
@@ -416,7 +417,7 @@
           <a:p>
             <a:fld id="{DAC9CD23-5E0E-47E2-9306-97F1D7E6AA5C}" type="datetimeFigureOut">
               <a:rPr lang="en-IN" smtClean="0"/>
-              <a:t>09-03-2018</a:t>
+              <a:t>19-03-2018</a:t>
             </a:fld>
             <a:endParaRPr lang="en-IN"/>
           </a:p>
@@ -596,7 +597,7 @@
           <a:p>
             <a:fld id="{DAC9CD23-5E0E-47E2-9306-97F1D7E6AA5C}" type="datetimeFigureOut">
               <a:rPr lang="en-IN" smtClean="0"/>
-              <a:t>09-03-2018</a:t>
+              <a:t>19-03-2018</a:t>
             </a:fld>
             <a:endParaRPr lang="en-IN"/>
           </a:p>
@@ -766,7 +767,7 @@
           <a:p>
             <a:fld id="{DAC9CD23-5E0E-47E2-9306-97F1D7E6AA5C}" type="datetimeFigureOut">
               <a:rPr lang="en-IN" smtClean="0"/>
-              <a:t>09-03-2018</a:t>
+              <a:t>19-03-2018</a:t>
             </a:fld>
             <a:endParaRPr lang="en-IN"/>
           </a:p>
@@ -1012,7 +1013,7 @@
           <a:p>
             <a:fld id="{DAC9CD23-5E0E-47E2-9306-97F1D7E6AA5C}" type="datetimeFigureOut">
               <a:rPr lang="en-IN" smtClean="0"/>
-              <a:t>09-03-2018</a:t>
+              <a:t>19-03-2018</a:t>
             </a:fld>
             <a:endParaRPr lang="en-IN"/>
           </a:p>
@@ -1244,7 +1245,7 @@
           <a:p>
             <a:fld id="{DAC9CD23-5E0E-47E2-9306-97F1D7E6AA5C}" type="datetimeFigureOut">
               <a:rPr lang="en-IN" smtClean="0"/>
-              <a:t>09-03-2018</a:t>
+              <a:t>19-03-2018</a:t>
             </a:fld>
             <a:endParaRPr lang="en-IN"/>
           </a:p>
@@ -1611,7 +1612,7 @@
           <a:p>
             <a:fld id="{DAC9CD23-5E0E-47E2-9306-97F1D7E6AA5C}" type="datetimeFigureOut">
               <a:rPr lang="en-IN" smtClean="0"/>
-              <a:t>09-03-2018</a:t>
+              <a:t>19-03-2018</a:t>
             </a:fld>
             <a:endParaRPr lang="en-IN"/>
           </a:p>
@@ -1729,7 +1730,7 @@
           <a:p>
             <a:fld id="{DAC9CD23-5E0E-47E2-9306-97F1D7E6AA5C}" type="datetimeFigureOut">
               <a:rPr lang="en-IN" smtClean="0"/>
-              <a:t>09-03-2018</a:t>
+              <a:t>19-03-2018</a:t>
             </a:fld>
             <a:endParaRPr lang="en-IN"/>
           </a:p>
@@ -1824,7 +1825,7 @@
           <a:p>
             <a:fld id="{DAC9CD23-5E0E-47E2-9306-97F1D7E6AA5C}" type="datetimeFigureOut">
               <a:rPr lang="en-IN" smtClean="0"/>
-              <a:t>09-03-2018</a:t>
+              <a:t>19-03-2018</a:t>
             </a:fld>
             <a:endParaRPr lang="en-IN"/>
           </a:p>
@@ -2101,7 +2102,7 @@
           <a:p>
             <a:fld id="{DAC9CD23-5E0E-47E2-9306-97F1D7E6AA5C}" type="datetimeFigureOut">
               <a:rPr lang="en-IN" smtClean="0"/>
-              <a:t>09-03-2018</a:t>
+              <a:t>19-03-2018</a:t>
             </a:fld>
             <a:endParaRPr lang="en-IN"/>
           </a:p>
@@ -2354,7 +2355,7 @@
           <a:p>
             <a:fld id="{DAC9CD23-5E0E-47E2-9306-97F1D7E6AA5C}" type="datetimeFigureOut">
               <a:rPr lang="en-IN" smtClean="0"/>
-              <a:t>09-03-2018</a:t>
+              <a:t>19-03-2018</a:t>
             </a:fld>
             <a:endParaRPr lang="en-IN"/>
           </a:p>
@@ -2567,7 +2568,7 @@
           <a:p>
             <a:fld id="{DAC9CD23-5E0E-47E2-9306-97F1D7E6AA5C}" type="datetimeFigureOut">
               <a:rPr lang="en-IN" smtClean="0"/>
-              <a:t>09-03-2018</a:t>
+              <a:t>19-03-2018</a:t>
             </a:fld>
             <a:endParaRPr lang="en-IN"/>
           </a:p>
@@ -8245,6 +8246,1007 @@
 </p:sld>
 </file>
 
+<file path=ppt/slides/slide5.xml><?xml version="1.0" encoding="utf-8"?>
+<p:sld xmlns:a="http://schemas.openxmlformats.org/drawingml/2006/main" xmlns:r="http://schemas.openxmlformats.org/officeDocument/2006/relationships" xmlns:p="http://schemas.openxmlformats.org/presentationml/2006/main">
+  <p:cSld>
+    <p:spTree>
+      <p:nvGrpSpPr>
+        <p:cNvPr id="1" name=""/>
+        <p:cNvGrpSpPr/>
+        <p:nvPr/>
+      </p:nvGrpSpPr>
+      <p:grpSpPr>
+        <a:xfrm>
+          <a:off x="0" y="0"/>
+          <a:ext cx="0" cy="0"/>
+          <a:chOff x="0" y="0"/>
+          <a:chExt cx="0" cy="0"/>
+        </a:xfrm>
+      </p:grpSpPr>
+      <p:sp>
+        <p:nvSpPr>
+          <p:cNvPr id="13" name="Pentagon 6">
+            <a:extLst>
+              <a:ext uri="{FF2B5EF4-FFF2-40B4-BE49-F238E27FC236}">
+                <a16:creationId xmlns:a16="http://schemas.microsoft.com/office/drawing/2014/main" id="{A0FC5746-EAC6-4318-B6B9-DC0267C218AF}"/>
+              </a:ext>
+            </a:extLst>
+          </p:cNvPr>
+          <p:cNvSpPr/>
+          <p:nvPr/>
+        </p:nvSpPr>
+        <p:spPr>
+          <a:xfrm>
+            <a:off x="6147100" y="276923"/>
+            <a:ext cx="2092292" cy="1015663"/>
+          </a:xfrm>
+          <a:prstGeom prst="homePlate">
+            <a:avLst/>
+          </a:prstGeom>
+        </p:spPr>
+        <p:txBody>
+          <a:bodyPr wrap="square">
+            <a:spAutoFit/>
+          </a:bodyPr>
+          <a:lstStyle/>
+          <a:p>
+            <a:pPr algn="ctr"/>
+            <a:r>
+              <a:rPr lang="en-IN" sz="4800" dirty="0">
+                <a:solidFill>
+                  <a:schemeClr val="accent1">
+                    <a:lumMod val="50000"/>
+                  </a:schemeClr>
+                </a:solidFill>
+                <a:latin typeface="Bauhaus 93" panose="04030905020B02020C02" pitchFamily="82" charset="0"/>
+                <a:cs typeface="Arial" panose="020B0604020202020204" pitchFamily="34" charset="0"/>
+              </a:rPr>
+              <a:t>NXP</a:t>
+            </a:r>
+            <a:r>
+              <a:rPr lang="en-IN" sz="6000" dirty="0">
+                <a:latin typeface="Haettenschweiler" panose="020B0706040902060204" pitchFamily="34" charset="0"/>
+                <a:cs typeface="Arial" panose="020B0604020202020204" pitchFamily="34" charset="0"/>
+              </a:rPr>
+              <a:t>JS</a:t>
+            </a:r>
+          </a:p>
+        </p:txBody>
+      </p:sp>
+      <p:grpSp>
+        <p:nvGrpSpPr>
+          <p:cNvPr id="37" name="Group 36">
+            <a:extLst>
+              <a:ext uri="{FF2B5EF4-FFF2-40B4-BE49-F238E27FC236}">
+                <a16:creationId xmlns:a16="http://schemas.microsoft.com/office/drawing/2014/main" id="{82989A33-479D-4136-8785-D674DC3F96D9}"/>
+              </a:ext>
+            </a:extLst>
+          </p:cNvPr>
+          <p:cNvGrpSpPr/>
+          <p:nvPr/>
+        </p:nvGrpSpPr>
+        <p:grpSpPr>
+          <a:xfrm>
+            <a:off x="6367463" y="2714843"/>
+            <a:ext cx="4131979" cy="1169551"/>
+            <a:chOff x="6367463" y="2714843"/>
+            <a:chExt cx="4131979" cy="1169551"/>
+          </a:xfrm>
+        </p:grpSpPr>
+        <p:grpSp>
+          <p:nvGrpSpPr>
+            <p:cNvPr id="3" name="Group 2">
+              <a:extLst>
+                <a:ext uri="{FF2B5EF4-FFF2-40B4-BE49-F238E27FC236}">
+                  <a16:creationId xmlns:a16="http://schemas.microsoft.com/office/drawing/2014/main" id="{14C157FD-E7AC-4F50-8CF2-5C5154DC38A6}"/>
+                </a:ext>
+              </a:extLst>
+            </p:cNvPr>
+            <p:cNvGrpSpPr/>
+            <p:nvPr/>
+          </p:nvGrpSpPr>
+          <p:grpSpPr>
+            <a:xfrm>
+              <a:off x="7022208" y="2714843"/>
+              <a:ext cx="3477234" cy="1169551"/>
+              <a:chOff x="7022208" y="2714843"/>
+              <a:chExt cx="3477234" cy="1169551"/>
+            </a:xfrm>
+          </p:grpSpPr>
+          <p:sp>
+            <p:nvSpPr>
+              <p:cNvPr id="5" name="TextBox 4"/>
+              <p:cNvSpPr txBox="1"/>
+              <p:nvPr/>
+            </p:nvSpPr>
+            <p:spPr>
+              <a:xfrm>
+                <a:off x="7376894" y="3545840"/>
+                <a:ext cx="2767862" cy="338554"/>
+              </a:xfrm>
+              <a:prstGeom prst="rect">
+                <a:avLst/>
+              </a:prstGeom>
+              <a:noFill/>
+            </p:spPr>
+            <p:txBody>
+              <a:bodyPr wrap="square" rtlCol="0">
+                <a:spAutoFit/>
+              </a:bodyPr>
+              <a:lstStyle/>
+              <a:p>
+                <a:r>
+                  <a:rPr lang="en-IN" sz="1600" dirty="0" err="1">
+                    <a:latin typeface="Segoe UI Semibold" panose="020B0702040204020203" pitchFamily="34" charset="0"/>
+                    <a:cs typeface="Segoe UI Semibold" panose="020B0702040204020203" pitchFamily="34" charset="0"/>
+                  </a:rPr>
+                  <a:t>Microservice</a:t>
+                </a:r>
+                <a:r>
+                  <a:rPr lang="en-IN" sz="1600" dirty="0">
+                    <a:latin typeface="Segoe UI Semibold" panose="020B0702040204020203" pitchFamily="34" charset="0"/>
+                    <a:cs typeface="Segoe UI Semibold" panose="020B0702040204020203" pitchFamily="34" charset="0"/>
+                  </a:rPr>
+                  <a:t> Starter</a:t>
+                </a:r>
+              </a:p>
+            </p:txBody>
+          </p:sp>
+          <p:sp>
+            <p:nvSpPr>
+              <p:cNvPr id="2" name="Rectangle 1"/>
+              <p:cNvSpPr/>
+              <p:nvPr/>
+            </p:nvSpPr>
+            <p:spPr>
+              <a:xfrm>
+                <a:off x="7022208" y="2714843"/>
+                <a:ext cx="3477234" cy="1015663"/>
+              </a:xfrm>
+              <a:prstGeom prst="rect">
+                <a:avLst/>
+              </a:prstGeom>
+            </p:spPr>
+            <p:txBody>
+              <a:bodyPr wrap="none">
+                <a:spAutoFit/>
+              </a:bodyPr>
+              <a:lstStyle/>
+              <a:p>
+                <a:pPr algn="ctr"/>
+                <a:r>
+                  <a:rPr lang="en-IN" sz="4800" dirty="0">
+                    <a:solidFill>
+                      <a:schemeClr val="accent1">
+                        <a:lumMod val="50000"/>
+                      </a:schemeClr>
+                    </a:solidFill>
+                    <a:latin typeface="Bauhaus 93" panose="04030905020B02020C02" pitchFamily="82" charset="0"/>
+                    <a:cs typeface="Arial" panose="020B0604020202020204" pitchFamily="34" charset="0"/>
+                  </a:rPr>
+                  <a:t>NXPLORER</a:t>
+                </a:r>
+                <a:r>
+                  <a:rPr lang="en-IN" sz="6000" dirty="0">
+                    <a:latin typeface="Haettenschweiler" panose="020B0706040902060204" pitchFamily="34" charset="0"/>
+                    <a:cs typeface="Arial" panose="020B0604020202020204" pitchFamily="34" charset="0"/>
+                  </a:rPr>
+                  <a:t>JS</a:t>
+                </a:r>
+                <a:endParaRPr lang="en-IN" sz="3200" dirty="0">
+                  <a:latin typeface="Haettenschweiler" panose="020B0706040902060204" pitchFamily="34" charset="0"/>
+                  <a:cs typeface="Arial" panose="020B0604020202020204" pitchFamily="34" charset="0"/>
+                </a:endParaRPr>
+              </a:p>
+            </p:txBody>
+          </p:sp>
+        </p:grpSp>
+        <p:grpSp>
+          <p:nvGrpSpPr>
+            <p:cNvPr id="29" name="Group 28">
+              <a:extLst>
+                <a:ext uri="{FF2B5EF4-FFF2-40B4-BE49-F238E27FC236}">
+                  <a16:creationId xmlns:a16="http://schemas.microsoft.com/office/drawing/2014/main" id="{6D454BA4-7614-4451-9635-3E78BDE6D04A}"/>
+                </a:ext>
+              </a:extLst>
+            </p:cNvPr>
+            <p:cNvGrpSpPr/>
+            <p:nvPr/>
+          </p:nvGrpSpPr>
+          <p:grpSpPr>
+            <a:xfrm>
+              <a:off x="6367463" y="2989138"/>
+              <a:ext cx="689988" cy="670746"/>
+              <a:chOff x="282790" y="1439385"/>
+              <a:chExt cx="689988" cy="670746"/>
+            </a:xfrm>
+          </p:grpSpPr>
+          <p:sp>
+            <p:nvSpPr>
+              <p:cNvPr id="30" name="Flowchart: Connector 29">
+                <a:extLst>
+                  <a:ext uri="{FF2B5EF4-FFF2-40B4-BE49-F238E27FC236}">
+                    <a16:creationId xmlns:a16="http://schemas.microsoft.com/office/drawing/2014/main" id="{556A0C8E-9381-49F6-982A-FF8392E9406B}"/>
+                  </a:ext>
+                </a:extLst>
+              </p:cNvPr>
+              <p:cNvSpPr/>
+              <p:nvPr/>
+            </p:nvSpPr>
+            <p:spPr>
+              <a:xfrm>
+                <a:off x="335280" y="1494467"/>
+                <a:ext cx="583308" cy="560580"/>
+              </a:xfrm>
+              <a:prstGeom prst="flowChartConnector">
+                <a:avLst/>
+              </a:prstGeom>
+              <a:ln>
+                <a:solidFill>
+                  <a:srgbClr val="1F4E79"/>
+                </a:solidFill>
+                <a:prstDash val="sysDot"/>
+              </a:ln>
+            </p:spPr>
+            <p:style>
+              <a:lnRef idx="2">
+                <a:schemeClr val="accent6"/>
+              </a:lnRef>
+              <a:fillRef idx="1">
+                <a:schemeClr val="lt1"/>
+              </a:fillRef>
+              <a:effectRef idx="0">
+                <a:schemeClr val="accent6"/>
+              </a:effectRef>
+              <a:fontRef idx="minor">
+                <a:schemeClr val="dk1"/>
+              </a:fontRef>
+            </p:style>
+            <p:txBody>
+              <a:bodyPr rtlCol="0" anchor="ctr"/>
+              <a:lstStyle/>
+              <a:p>
+                <a:pPr algn="ctr"/>
+                <a:endParaRPr lang="en-IN"/>
+              </a:p>
+            </p:txBody>
+          </p:sp>
+          <p:pic>
+            <p:nvPicPr>
+              <p:cNvPr id="31" name="Graphic 30" descr="Rocket">
+                <a:extLst>
+                  <a:ext uri="{FF2B5EF4-FFF2-40B4-BE49-F238E27FC236}">
+                    <a16:creationId xmlns:a16="http://schemas.microsoft.com/office/drawing/2014/main" id="{429FBEFD-B876-4317-8B19-FE4451DAE1BD}"/>
+                  </a:ext>
+                </a:extLst>
+              </p:cNvPr>
+              <p:cNvPicPr>
+                <a:picLocks noChangeAspect="1"/>
+              </p:cNvPicPr>
+              <p:nvPr/>
+            </p:nvPicPr>
+            <p:blipFill>
+              <a:blip r:embed="rId2">
+                <a:extLst>
+                  <a:ext uri="{28A0092B-C50C-407E-A947-70E740481C1C}">
+                    <a14:useLocalDpi xmlns:a14="http://schemas.microsoft.com/office/drawing/2010/main" val="0"/>
+                  </a:ext>
+                  <a:ext uri="{96DAC541-7B7A-43D3-8B79-37D633B846F1}">
+                    <asvg:svgBlip xmlns:asvg="http://schemas.microsoft.com/office/drawing/2016/SVG/main" r:embed="rId3"/>
+                  </a:ext>
+                </a:extLst>
+              </a:blip>
+              <a:stretch>
+                <a:fillRect/>
+              </a:stretch>
+            </p:blipFill>
+            <p:spPr>
+              <a:xfrm>
+                <a:off x="353173" y="1557704"/>
+                <a:ext cx="498288" cy="481667"/>
+              </a:xfrm>
+              <a:prstGeom prst="rect">
+                <a:avLst/>
+              </a:prstGeom>
+            </p:spPr>
+          </p:pic>
+          <p:sp>
+            <p:nvSpPr>
+              <p:cNvPr id="32" name="Flowchart: Connector 31">
+                <a:extLst>
+                  <a:ext uri="{FF2B5EF4-FFF2-40B4-BE49-F238E27FC236}">
+                    <a16:creationId xmlns:a16="http://schemas.microsoft.com/office/drawing/2014/main" id="{23E88FF2-DD19-4F3C-B012-0F06A7C7A672}"/>
+                  </a:ext>
+                </a:extLst>
+              </p:cNvPr>
+              <p:cNvSpPr/>
+              <p:nvPr/>
+            </p:nvSpPr>
+            <p:spPr>
+              <a:xfrm>
+                <a:off x="282790" y="1439385"/>
+                <a:ext cx="689988" cy="670746"/>
+              </a:xfrm>
+              <a:prstGeom prst="flowChartConnector">
+                <a:avLst/>
+              </a:prstGeom>
+              <a:noFill/>
+              <a:ln>
+                <a:solidFill>
+                  <a:srgbClr val="1F4E79"/>
+                </a:solidFill>
+              </a:ln>
+            </p:spPr>
+            <p:style>
+              <a:lnRef idx="2">
+                <a:schemeClr val="accent6"/>
+              </a:lnRef>
+              <a:fillRef idx="1">
+                <a:schemeClr val="lt1"/>
+              </a:fillRef>
+              <a:effectRef idx="0">
+                <a:schemeClr val="accent6"/>
+              </a:effectRef>
+              <a:fontRef idx="minor">
+                <a:schemeClr val="dk1"/>
+              </a:fontRef>
+            </p:style>
+            <p:txBody>
+              <a:bodyPr rtlCol="0" anchor="ctr"/>
+              <a:lstStyle/>
+              <a:p>
+                <a:pPr algn="ctr"/>
+                <a:endParaRPr lang="en-IN"/>
+              </a:p>
+            </p:txBody>
+          </p:sp>
+        </p:grpSp>
+      </p:grpSp>
+      <p:grpSp>
+        <p:nvGrpSpPr>
+          <p:cNvPr id="15" name="Group 14">
+            <a:extLst>
+              <a:ext uri="{FF2B5EF4-FFF2-40B4-BE49-F238E27FC236}">
+                <a16:creationId xmlns:a16="http://schemas.microsoft.com/office/drawing/2014/main" id="{CD2FE7F4-AEF7-4223-9768-ECC12C9B4AE9}"/>
+              </a:ext>
+            </a:extLst>
+          </p:cNvPr>
+          <p:cNvGrpSpPr/>
+          <p:nvPr/>
+        </p:nvGrpSpPr>
+        <p:grpSpPr>
+          <a:xfrm>
+            <a:off x="1762078" y="3631789"/>
+            <a:ext cx="793811" cy="880990"/>
+            <a:chOff x="1762078" y="3631789"/>
+            <a:chExt cx="793811" cy="880990"/>
+          </a:xfrm>
+        </p:grpSpPr>
+        <p:sp>
+          <p:nvSpPr>
+            <p:cNvPr id="4" name="Rectangle 3">
+              <a:extLst>
+                <a:ext uri="{FF2B5EF4-FFF2-40B4-BE49-F238E27FC236}">
+                  <a16:creationId xmlns:a16="http://schemas.microsoft.com/office/drawing/2014/main" id="{B0C6560B-1BF4-4429-B061-D7394CA7750C}"/>
+                </a:ext>
+              </a:extLst>
+            </p:cNvPr>
+            <p:cNvSpPr/>
+            <p:nvPr/>
+          </p:nvSpPr>
+          <p:spPr>
+            <a:xfrm>
+              <a:off x="1762078" y="3631789"/>
+              <a:ext cx="793811" cy="800100"/>
+            </a:xfrm>
+            <a:prstGeom prst="rect">
+              <a:avLst/>
+            </a:prstGeom>
+            <a:noFill/>
+            <a:ln>
+              <a:noFill/>
+            </a:ln>
+          </p:spPr>
+          <p:style>
+            <a:lnRef idx="2">
+              <a:schemeClr val="accent1">
+                <a:shade val="50000"/>
+              </a:schemeClr>
+            </a:lnRef>
+            <a:fillRef idx="1">
+              <a:schemeClr val="accent1"/>
+            </a:fillRef>
+            <a:effectRef idx="0">
+              <a:schemeClr val="accent1"/>
+            </a:effectRef>
+            <a:fontRef idx="minor">
+              <a:schemeClr val="lt1"/>
+            </a:fontRef>
+          </p:style>
+          <p:txBody>
+            <a:bodyPr rtlCol="0" anchor="ctr"/>
+            <a:lstStyle/>
+            <a:p>
+              <a:pPr algn="ctr"/>
+              <a:endParaRPr lang="en-IN"/>
+            </a:p>
+          </p:txBody>
+        </p:sp>
+        <p:grpSp>
+          <p:nvGrpSpPr>
+            <p:cNvPr id="48" name="Group 47">
+              <a:extLst>
+                <a:ext uri="{FF2B5EF4-FFF2-40B4-BE49-F238E27FC236}">
+                  <a16:creationId xmlns:a16="http://schemas.microsoft.com/office/drawing/2014/main" id="{CF06CFF5-FD3C-429F-AB94-5D407E8B3F65}"/>
+                </a:ext>
+              </a:extLst>
+            </p:cNvPr>
+            <p:cNvGrpSpPr/>
+            <p:nvPr/>
+          </p:nvGrpSpPr>
+          <p:grpSpPr>
+            <a:xfrm>
+              <a:off x="1762078" y="3701933"/>
+              <a:ext cx="793811" cy="810846"/>
+              <a:chOff x="7238953" y="1175044"/>
+              <a:chExt cx="793811" cy="810846"/>
+            </a:xfrm>
+          </p:grpSpPr>
+          <p:grpSp>
+            <p:nvGrpSpPr>
+              <p:cNvPr id="33" name="Group 32">
+                <a:extLst>
+                  <a:ext uri="{FF2B5EF4-FFF2-40B4-BE49-F238E27FC236}">
+                    <a16:creationId xmlns:a16="http://schemas.microsoft.com/office/drawing/2014/main" id="{18DAD386-B3FF-467B-9B99-795216A14276}"/>
+                  </a:ext>
+                </a:extLst>
+              </p:cNvPr>
+              <p:cNvGrpSpPr/>
+              <p:nvPr/>
+            </p:nvGrpSpPr>
+            <p:grpSpPr>
+              <a:xfrm>
+                <a:off x="7376252" y="1175044"/>
+                <a:ext cx="519212" cy="466792"/>
+                <a:chOff x="282791" y="1439385"/>
+                <a:chExt cx="689988" cy="670746"/>
+              </a:xfrm>
+            </p:grpSpPr>
+            <p:sp>
+              <p:nvSpPr>
+                <p:cNvPr id="34" name="Flowchart: Connector 33">
+                  <a:extLst>
+                    <a:ext uri="{FF2B5EF4-FFF2-40B4-BE49-F238E27FC236}">
+                      <a16:creationId xmlns:a16="http://schemas.microsoft.com/office/drawing/2014/main" id="{9E10C9DB-922C-44D7-AEF4-3D26A6C38EC7}"/>
+                    </a:ext>
+                  </a:extLst>
+                </p:cNvPr>
+                <p:cNvSpPr/>
+                <p:nvPr/>
+              </p:nvSpPr>
+              <p:spPr>
+                <a:xfrm>
+                  <a:off x="335281" y="1494467"/>
+                  <a:ext cx="583307" cy="560580"/>
+                </a:xfrm>
+                <a:prstGeom prst="flowChartConnector">
+                  <a:avLst/>
+                </a:prstGeom>
+                <a:noFill/>
+                <a:ln>
+                  <a:solidFill>
+                    <a:srgbClr val="1F4E79"/>
+                  </a:solidFill>
+                  <a:prstDash val="sysDot"/>
+                </a:ln>
+              </p:spPr>
+              <p:style>
+                <a:lnRef idx="2">
+                  <a:schemeClr val="accent6"/>
+                </a:lnRef>
+                <a:fillRef idx="1">
+                  <a:schemeClr val="lt1"/>
+                </a:fillRef>
+                <a:effectRef idx="0">
+                  <a:schemeClr val="accent6"/>
+                </a:effectRef>
+                <a:fontRef idx="minor">
+                  <a:schemeClr val="dk1"/>
+                </a:fontRef>
+              </p:style>
+              <p:txBody>
+                <a:bodyPr rtlCol="0" anchor="ctr"/>
+                <a:lstStyle/>
+                <a:p>
+                  <a:pPr algn="ctr"/>
+                  <a:endParaRPr lang="en-IN"/>
+                </a:p>
+              </p:txBody>
+            </p:sp>
+            <p:pic>
+              <p:nvPicPr>
+                <p:cNvPr id="35" name="Graphic 34" descr="Rocket">
+                  <a:extLst>
+                    <a:ext uri="{FF2B5EF4-FFF2-40B4-BE49-F238E27FC236}">
+                      <a16:creationId xmlns:a16="http://schemas.microsoft.com/office/drawing/2014/main" id="{DD3D5B0A-A586-4B16-A1FD-443C69D4E2A0}"/>
+                    </a:ext>
+                  </a:extLst>
+                </p:cNvPr>
+                <p:cNvPicPr>
+                  <a:picLocks noChangeAspect="1"/>
+                </p:cNvPicPr>
+                <p:nvPr/>
+              </p:nvPicPr>
+              <p:blipFill>
+                <a:blip r:embed="rId4" cstate="print">
+                  <a:extLst>
+                    <a:ext uri="{28A0092B-C50C-407E-A947-70E740481C1C}">
+                      <a14:useLocalDpi xmlns:a14="http://schemas.microsoft.com/office/drawing/2010/main" val="0"/>
+                    </a:ext>
+                    <a:ext uri="{96DAC541-7B7A-43D3-8B79-37D633B846F1}">
+                      <asvg:svgBlip xmlns:asvg="http://schemas.microsoft.com/office/drawing/2016/SVG/main" r:embed="rId5"/>
+                    </a:ext>
+                  </a:extLst>
+                </a:blip>
+                <a:stretch>
+                  <a:fillRect/>
+                </a:stretch>
+              </p:blipFill>
+              <p:spPr>
+                <a:xfrm>
+                  <a:off x="353172" y="1557703"/>
+                  <a:ext cx="498288" cy="481667"/>
+                </a:xfrm>
+                <a:prstGeom prst="rect">
+                  <a:avLst/>
+                </a:prstGeom>
+              </p:spPr>
+            </p:pic>
+            <p:sp>
+              <p:nvSpPr>
+                <p:cNvPr id="36" name="Flowchart: Connector 35">
+                  <a:extLst>
+                    <a:ext uri="{FF2B5EF4-FFF2-40B4-BE49-F238E27FC236}">
+                      <a16:creationId xmlns:a16="http://schemas.microsoft.com/office/drawing/2014/main" id="{546315AD-350D-4CA7-BE6D-298D50EA5D47}"/>
+                    </a:ext>
+                  </a:extLst>
+                </p:cNvPr>
+                <p:cNvSpPr/>
+                <p:nvPr/>
+              </p:nvSpPr>
+              <p:spPr>
+                <a:xfrm>
+                  <a:off x="282791" y="1439385"/>
+                  <a:ext cx="689988" cy="670746"/>
+                </a:xfrm>
+                <a:prstGeom prst="flowChartConnector">
+                  <a:avLst/>
+                </a:prstGeom>
+                <a:noFill/>
+                <a:ln>
+                  <a:solidFill>
+                    <a:srgbClr val="1F4E79"/>
+                  </a:solidFill>
+                </a:ln>
+              </p:spPr>
+              <p:style>
+                <a:lnRef idx="2">
+                  <a:schemeClr val="accent6"/>
+                </a:lnRef>
+                <a:fillRef idx="1">
+                  <a:schemeClr val="lt1"/>
+                </a:fillRef>
+                <a:effectRef idx="0">
+                  <a:schemeClr val="accent6"/>
+                </a:effectRef>
+                <a:fontRef idx="minor">
+                  <a:schemeClr val="dk1"/>
+                </a:fontRef>
+              </p:style>
+              <p:txBody>
+                <a:bodyPr rtlCol="0" anchor="ctr"/>
+                <a:lstStyle/>
+                <a:p>
+                  <a:pPr algn="ctr"/>
+                  <a:endParaRPr lang="en-IN"/>
+                </a:p>
+              </p:txBody>
+            </p:sp>
+          </p:grpSp>
+          <p:sp>
+            <p:nvSpPr>
+              <p:cNvPr id="47" name="TextBox 46">
+                <a:extLst>
+                  <a:ext uri="{FF2B5EF4-FFF2-40B4-BE49-F238E27FC236}">
+                    <a16:creationId xmlns:a16="http://schemas.microsoft.com/office/drawing/2014/main" id="{D3D0FB29-914B-4313-83E9-F83DEDA572DB}"/>
+                  </a:ext>
+                </a:extLst>
+              </p:cNvPr>
+              <p:cNvSpPr txBox="1"/>
+              <p:nvPr/>
+            </p:nvSpPr>
+            <p:spPr>
+              <a:xfrm>
+                <a:off x="7238953" y="1524225"/>
+                <a:ext cx="793811" cy="461665"/>
+              </a:xfrm>
+              <a:prstGeom prst="rect">
+                <a:avLst/>
+              </a:prstGeom>
+              <a:noFill/>
+            </p:spPr>
+            <p:txBody>
+              <a:bodyPr wrap="square" rtlCol="0">
+                <a:spAutoFit/>
+              </a:bodyPr>
+              <a:lstStyle/>
+              <a:p>
+                <a:r>
+                  <a:rPr lang="en-IN" dirty="0">
+                    <a:solidFill>
+                      <a:schemeClr val="accent1">
+                        <a:lumMod val="50000"/>
+                      </a:schemeClr>
+                    </a:solidFill>
+                    <a:latin typeface="Bauhaus 93" panose="04030905020B02020C02" pitchFamily="82" charset="0"/>
+                    <a:cs typeface="Arial" panose="020B0604020202020204" pitchFamily="34" charset="0"/>
+                  </a:rPr>
+                  <a:t>NXP</a:t>
+                </a:r>
+                <a:r>
+                  <a:rPr lang="en-IN" sz="2400" i="1" dirty="0">
+                    <a:solidFill>
+                      <a:srgbClr val="FF6600"/>
+                    </a:solidFill>
+                    <a:latin typeface="Haettenschweiler" panose="020B0706040902060204" pitchFamily="34" charset="0"/>
+                    <a:cs typeface="Arial" panose="020B0604020202020204" pitchFamily="34" charset="0"/>
+                  </a:rPr>
+                  <a:t>JS</a:t>
+                </a:r>
+                <a:endParaRPr lang="en-IN" i="1" dirty="0">
+                  <a:solidFill>
+                    <a:srgbClr val="FF6600"/>
+                  </a:solidFill>
+                </a:endParaRPr>
+              </a:p>
+            </p:txBody>
+          </p:sp>
+        </p:grpSp>
+      </p:grpSp>
+      <p:grpSp>
+        <p:nvGrpSpPr>
+          <p:cNvPr id="7" name="Group 6">
+            <a:extLst>
+              <a:ext uri="{FF2B5EF4-FFF2-40B4-BE49-F238E27FC236}">
+                <a16:creationId xmlns:a16="http://schemas.microsoft.com/office/drawing/2014/main" id="{33CD0872-92F8-49EF-A5F3-70B3202C3056}"/>
+              </a:ext>
+            </a:extLst>
+          </p:cNvPr>
+          <p:cNvGrpSpPr/>
+          <p:nvPr/>
+        </p:nvGrpSpPr>
+        <p:grpSpPr>
+          <a:xfrm>
+            <a:off x="501900" y="510466"/>
+            <a:ext cx="3492000" cy="1082573"/>
+            <a:chOff x="501900" y="510466"/>
+            <a:chExt cx="3492000" cy="1082573"/>
+          </a:xfrm>
+        </p:grpSpPr>
+        <p:grpSp>
+          <p:nvGrpSpPr>
+            <p:cNvPr id="6" name="Group 5">
+              <a:extLst>
+                <a:ext uri="{FF2B5EF4-FFF2-40B4-BE49-F238E27FC236}">
+                  <a16:creationId xmlns:a16="http://schemas.microsoft.com/office/drawing/2014/main" id="{976DBDA6-018B-4953-9875-7AFF2567BEF5}"/>
+                </a:ext>
+              </a:extLst>
+            </p:cNvPr>
+            <p:cNvGrpSpPr/>
+            <p:nvPr/>
+          </p:nvGrpSpPr>
+          <p:grpSpPr>
+            <a:xfrm>
+              <a:off x="501900" y="577376"/>
+              <a:ext cx="3492000" cy="1015663"/>
+              <a:chOff x="501900" y="577376"/>
+              <a:chExt cx="3492000" cy="1015663"/>
+            </a:xfrm>
+          </p:grpSpPr>
+          <p:grpSp>
+            <p:nvGrpSpPr>
+              <p:cNvPr id="28" name="Group 27">
+                <a:extLst>
+                  <a:ext uri="{FF2B5EF4-FFF2-40B4-BE49-F238E27FC236}">
+                    <a16:creationId xmlns:a16="http://schemas.microsoft.com/office/drawing/2014/main" id="{41ABAD00-4A1B-4656-9BCE-1292776E2BEC}"/>
+                  </a:ext>
+                </a:extLst>
+              </p:cNvPr>
+              <p:cNvGrpSpPr/>
+              <p:nvPr/>
+            </p:nvGrpSpPr>
+            <p:grpSpPr>
+              <a:xfrm>
+                <a:off x="1797797" y="978694"/>
+                <a:ext cx="485822" cy="431006"/>
+                <a:chOff x="282790" y="1439385"/>
+                <a:chExt cx="689988" cy="670746"/>
+              </a:xfrm>
+            </p:grpSpPr>
+            <p:sp>
+              <p:nvSpPr>
+                <p:cNvPr id="25" name="Flowchart: Connector 24">
+                  <a:extLst>
+                    <a:ext uri="{FF2B5EF4-FFF2-40B4-BE49-F238E27FC236}">
+                      <a16:creationId xmlns:a16="http://schemas.microsoft.com/office/drawing/2014/main" id="{70AD3343-F399-4A0C-8DCA-F19EB913974F}"/>
+                    </a:ext>
+                  </a:extLst>
+                </p:cNvPr>
+                <p:cNvSpPr/>
+                <p:nvPr/>
+              </p:nvSpPr>
+              <p:spPr>
+                <a:xfrm>
+                  <a:off x="335280" y="1494467"/>
+                  <a:ext cx="583308" cy="560580"/>
+                </a:xfrm>
+                <a:prstGeom prst="flowChartConnector">
+                  <a:avLst/>
+                </a:prstGeom>
+                <a:noFill/>
+                <a:ln w="3175">
+                  <a:solidFill>
+                    <a:srgbClr val="1F4E79"/>
+                  </a:solidFill>
+                  <a:prstDash val="sysDot"/>
+                </a:ln>
+                <a:effectLst>
+                  <a:outerShdw blurRad="76200" dir="18900000" sy="23000" kx="-1200000" algn="bl" rotWithShape="0">
+                    <a:prstClr val="black">
+                      <a:alpha val="20000"/>
+                    </a:prstClr>
+                  </a:outerShdw>
+                </a:effectLst>
+              </p:spPr>
+              <p:style>
+                <a:lnRef idx="2">
+                  <a:schemeClr val="accent6"/>
+                </a:lnRef>
+                <a:fillRef idx="1">
+                  <a:schemeClr val="lt1"/>
+                </a:fillRef>
+                <a:effectRef idx="0">
+                  <a:schemeClr val="accent6"/>
+                </a:effectRef>
+                <a:fontRef idx="minor">
+                  <a:schemeClr val="dk1"/>
+                </a:fontRef>
+              </p:style>
+              <p:txBody>
+                <a:bodyPr rtlCol="0" anchor="ctr"/>
+                <a:lstStyle/>
+                <a:p>
+                  <a:pPr algn="ctr"/>
+                  <a:endParaRPr lang="en-IN"/>
+                </a:p>
+              </p:txBody>
+            </p:sp>
+            <p:pic>
+              <p:nvPicPr>
+                <p:cNvPr id="26" name="Graphic 25" descr="Rocket">
+                  <a:extLst>
+                    <a:ext uri="{FF2B5EF4-FFF2-40B4-BE49-F238E27FC236}">
+                      <a16:creationId xmlns:a16="http://schemas.microsoft.com/office/drawing/2014/main" id="{9F2D7729-75C7-492E-91B3-6EA58A7882F3}"/>
+                    </a:ext>
+                  </a:extLst>
+                </p:cNvPr>
+                <p:cNvPicPr>
+                  <a:picLocks noChangeAspect="1"/>
+                </p:cNvPicPr>
+                <p:nvPr/>
+              </p:nvPicPr>
+              <p:blipFill>
+                <a:blip r:embed="rId4" cstate="print">
+                  <a:extLst>
+                    <a:ext uri="{28A0092B-C50C-407E-A947-70E740481C1C}">
+                      <a14:useLocalDpi xmlns:a14="http://schemas.microsoft.com/office/drawing/2010/main" val="0"/>
+                    </a:ext>
+                    <a:ext uri="{96DAC541-7B7A-43D3-8B79-37D633B846F1}">
+                      <asvg:svgBlip xmlns:asvg="http://schemas.microsoft.com/office/drawing/2016/SVG/main" r:embed="rId5"/>
+                    </a:ext>
+                  </a:extLst>
+                </a:blip>
+                <a:stretch>
+                  <a:fillRect/>
+                </a:stretch>
+              </p:blipFill>
+              <p:spPr>
+                <a:xfrm>
+                  <a:off x="353173" y="1557704"/>
+                  <a:ext cx="498288" cy="481667"/>
+                </a:xfrm>
+                <a:prstGeom prst="rect">
+                  <a:avLst/>
+                </a:prstGeom>
+              </p:spPr>
+            </p:pic>
+            <p:sp>
+              <p:nvSpPr>
+                <p:cNvPr id="27" name="Flowchart: Connector 26">
+                  <a:extLst>
+                    <a:ext uri="{FF2B5EF4-FFF2-40B4-BE49-F238E27FC236}">
+                      <a16:creationId xmlns:a16="http://schemas.microsoft.com/office/drawing/2014/main" id="{18B5B73D-E857-4CF8-872D-287745C0732E}"/>
+                    </a:ext>
+                  </a:extLst>
+                </p:cNvPr>
+                <p:cNvSpPr/>
+                <p:nvPr/>
+              </p:nvSpPr>
+              <p:spPr>
+                <a:xfrm>
+                  <a:off x="282790" y="1439385"/>
+                  <a:ext cx="689988" cy="670746"/>
+                </a:xfrm>
+                <a:prstGeom prst="flowChartConnector">
+                  <a:avLst/>
+                </a:prstGeom>
+                <a:noFill/>
+                <a:ln>
+                  <a:solidFill>
+                    <a:srgbClr val="1F4E79"/>
+                  </a:solidFill>
+                </a:ln>
+              </p:spPr>
+              <p:style>
+                <a:lnRef idx="2">
+                  <a:schemeClr val="accent6"/>
+                </a:lnRef>
+                <a:fillRef idx="1">
+                  <a:schemeClr val="lt1"/>
+                </a:fillRef>
+                <a:effectRef idx="0">
+                  <a:schemeClr val="accent6"/>
+                </a:effectRef>
+                <a:fontRef idx="minor">
+                  <a:schemeClr val="dk1"/>
+                </a:fontRef>
+              </p:style>
+              <p:txBody>
+                <a:bodyPr rtlCol="0" anchor="ctr"/>
+                <a:lstStyle/>
+                <a:p>
+                  <a:pPr algn="ctr"/>
+                  <a:endParaRPr lang="en-IN"/>
+                </a:p>
+              </p:txBody>
+            </p:sp>
+          </p:grpSp>
+          <p:sp>
+            <p:nvSpPr>
+              <p:cNvPr id="45" name="Rectangle 44">
+                <a:extLst>
+                  <a:ext uri="{FF2B5EF4-FFF2-40B4-BE49-F238E27FC236}">
+                    <a16:creationId xmlns:a16="http://schemas.microsoft.com/office/drawing/2014/main" id="{C8C8289D-2BA9-4CC1-A425-1E8A9B044B50}"/>
+                  </a:ext>
+                </a:extLst>
+              </p:cNvPr>
+              <p:cNvSpPr/>
+              <p:nvPr/>
+            </p:nvSpPr>
+            <p:spPr>
+              <a:xfrm>
+                <a:off x="501900" y="577376"/>
+                <a:ext cx="3492000" cy="1015663"/>
+              </a:xfrm>
+              <a:prstGeom prst="rect">
+                <a:avLst/>
+              </a:prstGeom>
+              <a:noFill/>
+              <a:ln>
+                <a:noFill/>
+              </a:ln>
+            </p:spPr>
+            <p:txBody>
+              <a:bodyPr wrap="square" anchor="ctr">
+                <a:spAutoFit/>
+              </a:bodyPr>
+              <a:lstStyle/>
+              <a:p>
+                <a:pPr algn="just"/>
+                <a:r>
+                  <a:rPr lang="en-IN" sz="4800" dirty="0">
+                    <a:solidFill>
+                      <a:schemeClr val="accent1">
+                        <a:lumMod val="50000"/>
+                      </a:schemeClr>
+                    </a:solidFill>
+                    <a:latin typeface="Bauhaus 93" panose="04030905020B02020C02" pitchFamily="82" charset="0"/>
+                    <a:cs typeface="Arial" panose="020B0604020202020204" pitchFamily="34" charset="0"/>
+                  </a:rPr>
+                  <a:t>NXPL   RER</a:t>
+                </a:r>
+                <a:r>
+                  <a:rPr lang="en-IN" sz="6000" i="1" dirty="0">
+                    <a:solidFill>
+                      <a:srgbClr val="FF6600"/>
+                    </a:solidFill>
+                    <a:latin typeface="Haettenschweiler" panose="020B0706040902060204" pitchFamily="34" charset="0"/>
+                    <a:cs typeface="Arial" panose="020B0604020202020204" pitchFamily="34" charset="0"/>
+                  </a:rPr>
+                  <a:t>JS</a:t>
+                </a:r>
+                <a:endParaRPr lang="en-IN" sz="3200" i="1" dirty="0">
+                  <a:solidFill>
+                    <a:srgbClr val="FF6600"/>
+                  </a:solidFill>
+                  <a:latin typeface="Haettenschweiler" panose="020B0706040902060204" pitchFamily="34" charset="0"/>
+                  <a:cs typeface="Arial" panose="020B0604020202020204" pitchFamily="34" charset="0"/>
+                </a:endParaRPr>
+              </a:p>
+            </p:txBody>
+          </p:sp>
+        </p:grpSp>
+        <p:pic>
+          <p:nvPicPr>
+            <p:cNvPr id="1026" name="Picture 2" descr="Image result for babel icon">
+              <a:extLst>
+                <a:ext uri="{FF2B5EF4-FFF2-40B4-BE49-F238E27FC236}">
+                  <a16:creationId xmlns:a16="http://schemas.microsoft.com/office/drawing/2014/main" id="{61CFCDF6-8FB8-40E9-B6B3-DE9F64A6D065}"/>
+                </a:ext>
+              </a:extLst>
+            </p:cNvPr>
+            <p:cNvPicPr>
+              <a:picLocks noChangeAspect="1" noChangeArrowheads="1"/>
+            </p:cNvPicPr>
+            <p:nvPr/>
+          </p:nvPicPr>
+          <p:blipFill>
+            <a:blip r:embed="rId6">
+              <a:extLst>
+                <a:ext uri="{28A0092B-C50C-407E-A947-70E740481C1C}">
+                  <a14:useLocalDpi xmlns:a14="http://schemas.microsoft.com/office/drawing/2010/main" val="0"/>
+                </a:ext>
+              </a:extLst>
+            </a:blip>
+            <a:srcRect/>
+            <a:stretch>
+              <a:fillRect/>
+            </a:stretch>
+          </p:blipFill>
+          <p:spPr bwMode="auto">
+            <a:xfrm>
+              <a:off x="2900692" y="510466"/>
+              <a:ext cx="678824" cy="678824"/>
+            </a:xfrm>
+            <a:prstGeom prst="rect">
+              <a:avLst/>
+            </a:prstGeom>
+            <a:noFill/>
+            <a:extLst>
+              <a:ext uri="{909E8E84-426E-40DD-AFC4-6F175D3DCCD1}">
+                <a14:hiddenFill xmlns:a14="http://schemas.microsoft.com/office/drawing/2010/main">
+                  <a:solidFill>
+                    <a:srgbClr val="FFFFFF"/>
+                  </a:solidFill>
+                </a14:hiddenFill>
+              </a:ext>
+            </a:extLst>
+          </p:spPr>
+        </p:pic>
+      </p:grpSp>
+    </p:spTree>
+    <p:extLst>
+      <p:ext uri="{BB962C8B-B14F-4D97-AF65-F5344CB8AC3E}">
+        <p14:creationId xmlns:p14="http://schemas.microsoft.com/office/powerpoint/2010/main" val="3975612645"/>
+      </p:ext>
+    </p:extLst>
+  </p:cSld>
+  <p:clrMapOvr>
+    <a:masterClrMapping/>
+  </p:clrMapOvr>
+</p:sld>
+</file>
+
 <file path=ppt/theme/theme1.xml><?xml version="1.0" encoding="utf-8"?>
 <a:theme xmlns:a="http://schemas.openxmlformats.org/drawingml/2006/main" name="Office Theme">
   <a:themeElements>

</xml_diff>

<commit_message>
Added IOC Container Singleton class
</commit_message>
<xml_diff>
--- a/screenshots/nxplorerjs.pptx
+++ b/screenshots/nxplorerjs.pptx
@@ -247,7 +247,7 @@
           <a:p>
             <a:fld id="{DAC9CD23-5E0E-47E2-9306-97F1D7E6AA5C}" type="datetimeFigureOut">
               <a:rPr lang="en-IN" smtClean="0"/>
-              <a:t>19-03-2018</a:t>
+              <a:t>27-07-2018</a:t>
             </a:fld>
             <a:endParaRPr lang="en-IN"/>
           </a:p>
@@ -417,7 +417,7 @@
           <a:p>
             <a:fld id="{DAC9CD23-5E0E-47E2-9306-97F1D7E6AA5C}" type="datetimeFigureOut">
               <a:rPr lang="en-IN" smtClean="0"/>
-              <a:t>19-03-2018</a:t>
+              <a:t>27-07-2018</a:t>
             </a:fld>
             <a:endParaRPr lang="en-IN"/>
           </a:p>
@@ -597,7 +597,7 @@
           <a:p>
             <a:fld id="{DAC9CD23-5E0E-47E2-9306-97F1D7E6AA5C}" type="datetimeFigureOut">
               <a:rPr lang="en-IN" smtClean="0"/>
-              <a:t>19-03-2018</a:t>
+              <a:t>27-07-2018</a:t>
             </a:fld>
             <a:endParaRPr lang="en-IN"/>
           </a:p>
@@ -767,7 +767,7 @@
           <a:p>
             <a:fld id="{DAC9CD23-5E0E-47E2-9306-97F1D7E6AA5C}" type="datetimeFigureOut">
               <a:rPr lang="en-IN" smtClean="0"/>
-              <a:t>19-03-2018</a:t>
+              <a:t>27-07-2018</a:t>
             </a:fld>
             <a:endParaRPr lang="en-IN"/>
           </a:p>
@@ -1013,7 +1013,7 @@
           <a:p>
             <a:fld id="{DAC9CD23-5E0E-47E2-9306-97F1D7E6AA5C}" type="datetimeFigureOut">
               <a:rPr lang="en-IN" smtClean="0"/>
-              <a:t>19-03-2018</a:t>
+              <a:t>27-07-2018</a:t>
             </a:fld>
             <a:endParaRPr lang="en-IN"/>
           </a:p>
@@ -1245,7 +1245,7 @@
           <a:p>
             <a:fld id="{DAC9CD23-5E0E-47E2-9306-97F1D7E6AA5C}" type="datetimeFigureOut">
               <a:rPr lang="en-IN" smtClean="0"/>
-              <a:t>19-03-2018</a:t>
+              <a:t>27-07-2018</a:t>
             </a:fld>
             <a:endParaRPr lang="en-IN"/>
           </a:p>
@@ -1612,7 +1612,7 @@
           <a:p>
             <a:fld id="{DAC9CD23-5E0E-47E2-9306-97F1D7E6AA5C}" type="datetimeFigureOut">
               <a:rPr lang="en-IN" smtClean="0"/>
-              <a:t>19-03-2018</a:t>
+              <a:t>27-07-2018</a:t>
             </a:fld>
             <a:endParaRPr lang="en-IN"/>
           </a:p>
@@ -1730,7 +1730,7 @@
           <a:p>
             <a:fld id="{DAC9CD23-5E0E-47E2-9306-97F1D7E6AA5C}" type="datetimeFigureOut">
               <a:rPr lang="en-IN" smtClean="0"/>
-              <a:t>19-03-2018</a:t>
+              <a:t>27-07-2018</a:t>
             </a:fld>
             <a:endParaRPr lang="en-IN"/>
           </a:p>
@@ -1825,7 +1825,7 @@
           <a:p>
             <a:fld id="{DAC9CD23-5E0E-47E2-9306-97F1D7E6AA5C}" type="datetimeFigureOut">
               <a:rPr lang="en-IN" smtClean="0"/>
-              <a:t>19-03-2018</a:t>
+              <a:t>27-07-2018</a:t>
             </a:fld>
             <a:endParaRPr lang="en-IN"/>
           </a:p>
@@ -2102,7 +2102,7 @@
           <a:p>
             <a:fld id="{DAC9CD23-5E0E-47E2-9306-97F1D7E6AA5C}" type="datetimeFigureOut">
               <a:rPr lang="en-IN" smtClean="0"/>
-              <a:t>19-03-2018</a:t>
+              <a:t>27-07-2018</a:t>
             </a:fld>
             <a:endParaRPr lang="en-IN"/>
           </a:p>
@@ -2355,7 +2355,7 @@
           <a:p>
             <a:fld id="{DAC9CD23-5E0E-47E2-9306-97F1D7E6AA5C}" type="datetimeFigureOut">
               <a:rPr lang="en-IN" smtClean="0"/>
-              <a:t>19-03-2018</a:t>
+              <a:t>27-07-2018</a:t>
             </a:fld>
             <a:endParaRPr lang="en-IN"/>
           </a:p>
@@ -2568,7 +2568,7 @@
           <a:p>
             <a:fld id="{DAC9CD23-5E0E-47E2-9306-97F1D7E6AA5C}" type="datetimeFigureOut">
               <a:rPr lang="en-IN" smtClean="0"/>
-              <a:t>19-03-2018</a:t>
+              <a:t>27-07-2018</a:t>
             </a:fld>
             <a:endParaRPr lang="en-IN"/>
           </a:p>
@@ -9234,6 +9234,109 @@
           </p:spPr>
         </p:pic>
       </p:grpSp>
+      <p:sp>
+        <p:nvSpPr>
+          <p:cNvPr id="44" name="Rectangle 43">
+            <a:extLst>
+              <a:ext uri="{FF2B5EF4-FFF2-40B4-BE49-F238E27FC236}">
+                <a16:creationId xmlns:a16="http://schemas.microsoft.com/office/drawing/2014/main" id="{95A51352-CBD7-4E6E-BAE3-F1FFC66D7019}"/>
+              </a:ext>
+            </a:extLst>
+          </p:cNvPr>
+          <p:cNvSpPr/>
+          <p:nvPr/>
+        </p:nvSpPr>
+        <p:spPr>
+          <a:xfrm>
+            <a:off x="5276298" y="4651277"/>
+            <a:ext cx="4424294" cy="1015663"/>
+          </a:xfrm>
+          <a:prstGeom prst="rect">
+            <a:avLst/>
+          </a:prstGeom>
+          <a:noFill/>
+          <a:ln>
+            <a:noFill/>
+          </a:ln>
+        </p:spPr>
+        <p:txBody>
+          <a:bodyPr wrap="square" anchor="ctr">
+            <a:spAutoFit/>
+          </a:bodyPr>
+          <a:lstStyle/>
+          <a:p>
+            <a:pPr algn="just"/>
+            <a:r>
+              <a:rPr lang="en-IN" sz="4800" dirty="0" err="1">
+                <a:solidFill>
+                  <a:schemeClr val="accent1">
+                    <a:lumMod val="50000"/>
+                  </a:schemeClr>
+                </a:solidFill>
+                <a:latin typeface="Magneto" panose="04030805050802020D02" pitchFamily="82" charset="0"/>
+                <a:cs typeface="Arial" panose="020B0604020202020204" pitchFamily="34" charset="0"/>
+              </a:rPr>
+              <a:t>NXPlorer</a:t>
+            </a:r>
+            <a:r>
+              <a:rPr lang="en-IN" sz="6000" i="1" dirty="0" err="1">
+                <a:solidFill>
+                  <a:srgbClr val="FF6600"/>
+                </a:solidFill>
+                <a:latin typeface="Haettenschweiler" panose="020B0706040902060204" pitchFamily="34" charset="0"/>
+                <a:cs typeface="Arial" panose="020B0604020202020204" pitchFamily="34" charset="0"/>
+              </a:rPr>
+              <a:t>JS</a:t>
+            </a:r>
+            <a:endParaRPr lang="en-IN" sz="3200" i="1" dirty="0">
+              <a:solidFill>
+                <a:srgbClr val="FF6600"/>
+              </a:solidFill>
+              <a:latin typeface="Haettenschweiler" panose="020B0706040902060204" pitchFamily="34" charset="0"/>
+              <a:cs typeface="Arial" panose="020B0604020202020204" pitchFamily="34" charset="0"/>
+            </a:endParaRPr>
+          </a:p>
+        </p:txBody>
+      </p:sp>
+      <p:pic>
+        <p:nvPicPr>
+          <p:cNvPr id="51" name="Graphic 50" descr="Rocket">
+            <a:extLst>
+              <a:ext uri="{FF2B5EF4-FFF2-40B4-BE49-F238E27FC236}">
+                <a16:creationId xmlns:a16="http://schemas.microsoft.com/office/drawing/2014/main" id="{664C892C-1640-4F24-B4F2-237EA35E5C92}"/>
+              </a:ext>
+            </a:extLst>
+          </p:cNvPr>
+          <p:cNvPicPr>
+            <a:picLocks noChangeAspect="1"/>
+          </p:cNvPicPr>
+          <p:nvPr/>
+        </p:nvPicPr>
+        <p:blipFill>
+          <a:blip r:embed="rId4" cstate="print">
+            <a:extLst>
+              <a:ext uri="{28A0092B-C50C-407E-A947-70E740481C1C}">
+                <a14:useLocalDpi xmlns:a14="http://schemas.microsoft.com/office/drawing/2010/main" val="0"/>
+              </a:ext>
+              <a:ext uri="{96DAC541-7B7A-43D3-8B79-37D633B846F1}">
+                <asvg:svgBlip xmlns:asvg="http://schemas.microsoft.com/office/drawing/2016/SVG/main" r:embed="rId5"/>
+              </a:ext>
+            </a:extLst>
+          </a:blip>
+          <a:stretch>
+            <a:fillRect/>
+          </a:stretch>
+        </p:blipFill>
+        <p:spPr>
+          <a:xfrm>
+            <a:off x="7193246" y="5040712"/>
+            <a:ext cx="407127" cy="224101"/>
+          </a:xfrm>
+          <a:prstGeom prst="rect">
+            <a:avLst/>
+          </a:prstGeom>
+        </p:spPr>
+      </p:pic>
     </p:spTree>
     <p:extLst>
       <p:ext uri="{BB962C8B-B14F-4D97-AF65-F5344CB8AC3E}">

</xml_diff>

<commit_message>
Added node progress bar
</commit_message>
<xml_diff>
--- a/screenshots/nxplorerjs.pptx
+++ b/screenshots/nxplorerjs.pptx
@@ -10,6 +10,7 @@
     <p:sldId id="257" r:id="rId4"/>
     <p:sldId id="258" r:id="rId5"/>
     <p:sldId id="261" r:id="rId6"/>
+    <p:sldId id="262" r:id="rId7"/>
   </p:sldIdLst>
   <p:sldSz cx="12192000" cy="6858000"/>
   <p:notesSz cx="6858000" cy="9144000"/>
@@ -247,7 +248,7 @@
           <a:p>
             <a:fld id="{DAC9CD23-5E0E-47E2-9306-97F1D7E6AA5C}" type="datetimeFigureOut">
               <a:rPr lang="en-IN" smtClean="0"/>
-              <a:t>27-07-2018</a:t>
+              <a:t>31-07-2018</a:t>
             </a:fld>
             <a:endParaRPr lang="en-IN"/>
           </a:p>
@@ -417,7 +418,7 @@
           <a:p>
             <a:fld id="{DAC9CD23-5E0E-47E2-9306-97F1D7E6AA5C}" type="datetimeFigureOut">
               <a:rPr lang="en-IN" smtClean="0"/>
-              <a:t>27-07-2018</a:t>
+              <a:t>31-07-2018</a:t>
             </a:fld>
             <a:endParaRPr lang="en-IN"/>
           </a:p>
@@ -597,7 +598,7 @@
           <a:p>
             <a:fld id="{DAC9CD23-5E0E-47E2-9306-97F1D7E6AA5C}" type="datetimeFigureOut">
               <a:rPr lang="en-IN" smtClean="0"/>
-              <a:t>27-07-2018</a:t>
+              <a:t>31-07-2018</a:t>
             </a:fld>
             <a:endParaRPr lang="en-IN"/>
           </a:p>
@@ -767,7 +768,7 @@
           <a:p>
             <a:fld id="{DAC9CD23-5E0E-47E2-9306-97F1D7E6AA5C}" type="datetimeFigureOut">
               <a:rPr lang="en-IN" smtClean="0"/>
-              <a:t>27-07-2018</a:t>
+              <a:t>31-07-2018</a:t>
             </a:fld>
             <a:endParaRPr lang="en-IN"/>
           </a:p>
@@ -1013,7 +1014,7 @@
           <a:p>
             <a:fld id="{DAC9CD23-5E0E-47E2-9306-97F1D7E6AA5C}" type="datetimeFigureOut">
               <a:rPr lang="en-IN" smtClean="0"/>
-              <a:t>27-07-2018</a:t>
+              <a:t>31-07-2018</a:t>
             </a:fld>
             <a:endParaRPr lang="en-IN"/>
           </a:p>
@@ -1245,7 +1246,7 @@
           <a:p>
             <a:fld id="{DAC9CD23-5E0E-47E2-9306-97F1D7E6AA5C}" type="datetimeFigureOut">
               <a:rPr lang="en-IN" smtClean="0"/>
-              <a:t>27-07-2018</a:t>
+              <a:t>31-07-2018</a:t>
             </a:fld>
             <a:endParaRPr lang="en-IN"/>
           </a:p>
@@ -1612,7 +1613,7 @@
           <a:p>
             <a:fld id="{DAC9CD23-5E0E-47E2-9306-97F1D7E6AA5C}" type="datetimeFigureOut">
               <a:rPr lang="en-IN" smtClean="0"/>
-              <a:t>27-07-2018</a:t>
+              <a:t>31-07-2018</a:t>
             </a:fld>
             <a:endParaRPr lang="en-IN"/>
           </a:p>
@@ -1730,7 +1731,7 @@
           <a:p>
             <a:fld id="{DAC9CD23-5E0E-47E2-9306-97F1D7E6AA5C}" type="datetimeFigureOut">
               <a:rPr lang="en-IN" smtClean="0"/>
-              <a:t>27-07-2018</a:t>
+              <a:t>31-07-2018</a:t>
             </a:fld>
             <a:endParaRPr lang="en-IN"/>
           </a:p>
@@ -1825,7 +1826,7 @@
           <a:p>
             <a:fld id="{DAC9CD23-5E0E-47E2-9306-97F1D7E6AA5C}" type="datetimeFigureOut">
               <a:rPr lang="en-IN" smtClean="0"/>
-              <a:t>27-07-2018</a:t>
+              <a:t>31-07-2018</a:t>
             </a:fld>
             <a:endParaRPr lang="en-IN"/>
           </a:p>
@@ -2102,7 +2103,7 @@
           <a:p>
             <a:fld id="{DAC9CD23-5E0E-47E2-9306-97F1D7E6AA5C}" type="datetimeFigureOut">
               <a:rPr lang="en-IN" smtClean="0"/>
-              <a:t>27-07-2018</a:t>
+              <a:t>31-07-2018</a:t>
             </a:fld>
             <a:endParaRPr lang="en-IN"/>
           </a:p>
@@ -2355,7 +2356,7 @@
           <a:p>
             <a:fld id="{DAC9CD23-5E0E-47E2-9306-97F1D7E6AA5C}" type="datetimeFigureOut">
               <a:rPr lang="en-IN" smtClean="0"/>
-              <a:t>27-07-2018</a:t>
+              <a:t>31-07-2018</a:t>
             </a:fld>
             <a:endParaRPr lang="en-IN"/>
           </a:p>
@@ -2568,7 +2569,7 @@
           <a:p>
             <a:fld id="{DAC9CD23-5E0E-47E2-9306-97F1D7E6AA5C}" type="datetimeFigureOut">
               <a:rPr lang="en-IN" smtClean="0"/>
-              <a:t>27-07-2018</a:t>
+              <a:t>31-07-2018</a:t>
             </a:fld>
             <a:endParaRPr lang="en-IN"/>
           </a:p>
@@ -9234,113 +9235,1668 @@
           </p:spPr>
         </p:pic>
       </p:grpSp>
-      <p:sp>
-        <p:nvSpPr>
-          <p:cNvPr id="44" name="Rectangle 43">
+      <p:grpSp>
+        <p:nvGrpSpPr>
+          <p:cNvPr id="11" name="Group 10">
             <a:extLst>
               <a:ext uri="{FF2B5EF4-FFF2-40B4-BE49-F238E27FC236}">
-                <a16:creationId xmlns:a16="http://schemas.microsoft.com/office/drawing/2014/main" id="{95A51352-CBD7-4E6E-BAE3-F1FFC66D7019}"/>
+                <a16:creationId xmlns:a16="http://schemas.microsoft.com/office/drawing/2014/main" id="{9AF16EB3-E8F5-466D-A481-5BEC18E4CB01}"/>
               </a:ext>
             </a:extLst>
           </p:cNvPr>
-          <p:cNvSpPr/>
+          <p:cNvGrpSpPr/>
           <p:nvPr/>
-        </p:nvSpPr>
-        <p:spPr>
+        </p:nvGrpSpPr>
+        <p:grpSpPr>
           <a:xfrm>
-            <a:off x="5276298" y="4651277"/>
-            <a:ext cx="4424294" cy="1015663"/>
+            <a:off x="5276298" y="4928276"/>
+            <a:ext cx="4424294" cy="1025117"/>
+            <a:chOff x="5276298" y="4374280"/>
+            <a:chExt cx="4424294" cy="1584269"/>
           </a:xfrm>
-          <a:prstGeom prst="rect">
-            <a:avLst/>
-          </a:prstGeom>
-          <a:noFill/>
-          <a:ln>
+        </p:grpSpPr>
+        <p:sp>
+          <p:nvSpPr>
+            <p:cNvPr id="44" name="Rectangle 43">
+              <a:extLst>
+                <a:ext uri="{FF2B5EF4-FFF2-40B4-BE49-F238E27FC236}">
+                  <a16:creationId xmlns:a16="http://schemas.microsoft.com/office/drawing/2014/main" id="{95A51352-CBD7-4E6E-BAE3-F1FFC66D7019}"/>
+                </a:ext>
+              </a:extLst>
+            </p:cNvPr>
+            <p:cNvSpPr/>
+            <p:nvPr/>
+          </p:nvSpPr>
+          <p:spPr>
+            <a:xfrm>
+              <a:off x="5276298" y="4374280"/>
+              <a:ext cx="4424294" cy="1569660"/>
+            </a:xfrm>
+            <a:prstGeom prst="rect">
+              <a:avLst/>
+            </a:prstGeom>
             <a:noFill/>
-          </a:ln>
-        </p:spPr>
-        <p:txBody>
-          <a:bodyPr wrap="square" anchor="ctr">
-            <a:spAutoFit/>
-          </a:bodyPr>
-          <a:lstStyle/>
-          <a:p>
-            <a:pPr algn="just"/>
-            <a:r>
-              <a:rPr lang="en-IN" sz="4800" dirty="0" err="1">
-                <a:solidFill>
-                  <a:schemeClr val="accent1">
-                    <a:lumMod val="50000"/>
-                  </a:schemeClr>
-                </a:solidFill>
-                <a:latin typeface="Magneto" panose="04030805050802020D02" pitchFamily="82" charset="0"/>
-                <a:cs typeface="Arial" panose="020B0604020202020204" pitchFamily="34" charset="0"/>
-              </a:rPr>
-              <a:t>NXPlorer</a:t>
-            </a:r>
-            <a:r>
-              <a:rPr lang="en-IN" sz="6000" i="1" dirty="0" err="1">
+            <a:ln>
+              <a:noFill/>
+            </a:ln>
+          </p:spPr>
+          <p:txBody>
+            <a:bodyPr wrap="square" anchor="ctr">
+              <a:spAutoFit/>
+            </a:bodyPr>
+            <a:lstStyle/>
+            <a:p>
+              <a:pPr algn="just"/>
+              <a:r>
+                <a:rPr lang="en-IN" sz="9600" dirty="0">
+                  <a:solidFill>
+                    <a:schemeClr val="accent1">
+                      <a:lumMod val="50000"/>
+                    </a:schemeClr>
+                  </a:solidFill>
+                  <a:latin typeface="Playbill" panose="040506030A0602020202" pitchFamily="82" charset="0"/>
+                  <a:ea typeface="HGMaruGothicMPRO" panose="020B0400000000000000" pitchFamily="34" charset="-128"/>
+                  <a:cs typeface="Arial" panose="020B0604020202020204" pitchFamily="34" charset="0"/>
+                </a:rPr>
+                <a:t>NXPLORER</a:t>
+              </a:r>
+              <a:r>
+                <a:rPr lang="en-IN" sz="8000" i="1" dirty="0">
+                  <a:solidFill>
+                    <a:srgbClr val="FF6600"/>
+                  </a:solidFill>
+                  <a:latin typeface="Gill Sans Ultra Bold Condensed" panose="020B0A06020104020203" pitchFamily="34" charset="0"/>
+                  <a:cs typeface="Arial" panose="020B0604020202020204" pitchFamily="34" charset="0"/>
+                </a:rPr>
+                <a:t>JS</a:t>
+              </a:r>
+              <a:endParaRPr lang="en-IN" sz="4400" i="1" dirty="0">
                 <a:solidFill>
                   <a:srgbClr val="FF6600"/>
                 </a:solidFill>
-                <a:latin typeface="Haettenschweiler" panose="020B0706040902060204" pitchFamily="34" charset="0"/>
+                <a:latin typeface="Gill Sans Ultra Bold Condensed" panose="020B0A06020104020203" pitchFamily="34" charset="0"/>
                 <a:cs typeface="Arial" panose="020B0604020202020204" pitchFamily="34" charset="0"/>
-              </a:rPr>
-              <a:t>JS</a:t>
-            </a:r>
-            <a:endParaRPr lang="en-IN" sz="3200" i="1" dirty="0">
-              <a:solidFill>
-                <a:srgbClr val="FF6600"/>
-              </a:solidFill>
-              <a:latin typeface="Haettenschweiler" panose="020B0706040902060204" pitchFamily="34" charset="0"/>
-              <a:cs typeface="Arial" panose="020B0604020202020204" pitchFamily="34" charset="0"/>
-            </a:endParaRPr>
-          </a:p>
-        </p:txBody>
-      </p:sp>
-      <p:pic>
-        <p:nvPicPr>
-          <p:cNvPr id="51" name="Graphic 50" descr="Rocket">
-            <a:extLst>
-              <a:ext uri="{FF2B5EF4-FFF2-40B4-BE49-F238E27FC236}">
-                <a16:creationId xmlns:a16="http://schemas.microsoft.com/office/drawing/2014/main" id="{664C892C-1640-4F24-B4F2-237EA35E5C92}"/>
-              </a:ext>
-            </a:extLst>
-          </p:cNvPr>
-          <p:cNvPicPr>
-            <a:picLocks noChangeAspect="1"/>
-          </p:cNvPicPr>
-          <p:nvPr/>
-        </p:nvPicPr>
-        <p:blipFill>
-          <a:blip r:embed="rId4" cstate="print">
-            <a:extLst>
-              <a:ext uri="{28A0092B-C50C-407E-A947-70E740481C1C}">
-                <a14:useLocalDpi xmlns:a14="http://schemas.microsoft.com/office/drawing/2010/main" val="0"/>
-              </a:ext>
-              <a:ext uri="{96DAC541-7B7A-43D3-8B79-37D633B846F1}">
-                <asvg:svgBlip xmlns:asvg="http://schemas.microsoft.com/office/drawing/2016/SVG/main" r:embed="rId5"/>
-              </a:ext>
-            </a:extLst>
-          </a:blip>
-          <a:stretch>
-            <a:fillRect/>
-          </a:stretch>
-        </p:blipFill>
-        <p:spPr>
-          <a:xfrm>
-            <a:off x="7193246" y="5040712"/>
-            <a:ext cx="407127" cy="224101"/>
-          </a:xfrm>
-          <a:prstGeom prst="rect">
-            <a:avLst/>
-          </a:prstGeom>
-        </p:spPr>
-      </p:pic>
+              </a:endParaRPr>
+            </a:p>
+          </p:txBody>
+        </p:sp>
+        <p:pic>
+          <p:nvPicPr>
+            <p:cNvPr id="51" name="Graphic 50" descr="Rocket">
+              <a:extLst>
+                <a:ext uri="{FF2B5EF4-FFF2-40B4-BE49-F238E27FC236}">
+                  <a16:creationId xmlns:a16="http://schemas.microsoft.com/office/drawing/2014/main" id="{664C892C-1640-4F24-B4F2-237EA35E5C92}"/>
+                </a:ext>
+              </a:extLst>
+            </p:cNvPr>
+            <p:cNvPicPr>
+              <a:picLocks noChangeAspect="1"/>
+            </p:cNvPicPr>
+            <p:nvPr/>
+          </p:nvPicPr>
+          <p:blipFill>
+            <a:blip r:embed="rId7" cstate="print">
+              <a:extLst>
+                <a:ext uri="{28A0092B-C50C-407E-A947-70E740481C1C}">
+                  <a14:useLocalDpi xmlns:a14="http://schemas.microsoft.com/office/drawing/2010/main" val="0"/>
+                </a:ext>
+                <a:ext uri="{96DAC541-7B7A-43D3-8B79-37D633B846F1}">
+                  <asvg:svgBlip xmlns:asvg="http://schemas.microsoft.com/office/drawing/2016/SVG/main" r:embed="rId8"/>
+                </a:ext>
+              </a:extLst>
+            </a:blip>
+            <a:stretch>
+              <a:fillRect/>
+            </a:stretch>
+          </p:blipFill>
+          <p:spPr>
+            <a:xfrm>
+              <a:off x="8548823" y="5137506"/>
+              <a:ext cx="266566" cy="261252"/>
+            </a:xfrm>
+            <a:prstGeom prst="rect">
+              <a:avLst/>
+            </a:prstGeom>
+            <a:effectLst/>
+          </p:spPr>
+        </p:pic>
+        <p:pic>
+          <p:nvPicPr>
+            <p:cNvPr id="9" name="Graphic 8" descr="Hierarchy">
+              <a:extLst>
+                <a:ext uri="{FF2B5EF4-FFF2-40B4-BE49-F238E27FC236}">
+                  <a16:creationId xmlns:a16="http://schemas.microsoft.com/office/drawing/2014/main" id="{F810B561-B606-4273-A414-A7B0D54F1E9E}"/>
+                </a:ext>
+              </a:extLst>
+            </p:cNvPr>
+            <p:cNvPicPr>
+              <a:picLocks noChangeAspect="1"/>
+            </p:cNvPicPr>
+            <p:nvPr/>
+          </p:nvPicPr>
+          <p:blipFill>
+            <a:blip r:embed="rId9" cstate="print">
+              <a:extLst>
+                <a:ext uri="{28A0092B-C50C-407E-A947-70E740481C1C}">
+                  <a14:useLocalDpi xmlns:a14="http://schemas.microsoft.com/office/drawing/2010/main" val="0"/>
+                </a:ext>
+                <a:ext uri="{96DAC541-7B7A-43D3-8B79-37D633B846F1}">
+                  <asvg:svgBlip xmlns:asvg="http://schemas.microsoft.com/office/drawing/2016/SVG/main" r:embed="rId10"/>
+                </a:ext>
+              </a:extLst>
+            </a:blip>
+            <a:stretch>
+              <a:fillRect/>
+            </a:stretch>
+          </p:blipFill>
+          <p:spPr>
+            <a:xfrm>
+              <a:off x="8548823" y="4721214"/>
+              <a:ext cx="360269" cy="360270"/>
+            </a:xfrm>
+            <a:prstGeom prst="rect">
+              <a:avLst/>
+            </a:prstGeom>
+          </p:spPr>
+        </p:pic>
+        <p:sp>
+          <p:nvSpPr>
+            <p:cNvPr id="10" name="TextBox 9">
+              <a:extLst>
+                <a:ext uri="{FF2B5EF4-FFF2-40B4-BE49-F238E27FC236}">
+                  <a16:creationId xmlns:a16="http://schemas.microsoft.com/office/drawing/2014/main" id="{FD955ADA-4CD1-462A-98D0-637EC6FDC030}"/>
+                </a:ext>
+              </a:extLst>
+            </p:cNvPr>
+            <p:cNvSpPr txBox="1"/>
+            <p:nvPr/>
+          </p:nvSpPr>
+          <p:spPr>
+            <a:xfrm>
+              <a:off x="8939233" y="5530460"/>
+              <a:ext cx="653176" cy="428089"/>
+            </a:xfrm>
+            <a:prstGeom prst="rect">
+              <a:avLst/>
+            </a:prstGeom>
+            <a:noFill/>
+          </p:spPr>
+          <p:txBody>
+            <a:bodyPr wrap="square" rtlCol="0">
+              <a:spAutoFit/>
+            </a:bodyPr>
+            <a:lstStyle/>
+            <a:p>
+              <a:pPr algn="ctr"/>
+              <a:r>
+                <a:rPr lang="en-IN" sz="1200" dirty="0">
+                  <a:solidFill>
+                    <a:schemeClr val="bg1"/>
+                  </a:solidFill>
+                  <a:latin typeface="Browallia New" panose="020B0604020202020204" pitchFamily="34" charset="-34"/>
+                  <a:cs typeface="Browallia New" panose="020B0604020202020204" pitchFamily="34" charset="-34"/>
+                </a:rPr>
+                <a:t>MONO</a:t>
+              </a:r>
+            </a:p>
+          </p:txBody>
+        </p:sp>
+      </p:grpSp>
     </p:spTree>
     <p:extLst>
       <p:ext uri="{BB962C8B-B14F-4D97-AF65-F5344CB8AC3E}">
         <p14:creationId xmlns:p14="http://schemas.microsoft.com/office/powerpoint/2010/main" val="3975612645"/>
+      </p:ext>
+    </p:extLst>
+  </p:cSld>
+  <p:clrMapOvr>
+    <a:masterClrMapping/>
+  </p:clrMapOvr>
+</p:sld>
+</file>
+
+<file path=ppt/slides/slide6.xml><?xml version="1.0" encoding="utf-8"?>
+<p:sld xmlns:a="http://schemas.openxmlformats.org/drawingml/2006/main" xmlns:r="http://schemas.openxmlformats.org/officeDocument/2006/relationships" xmlns:p="http://schemas.openxmlformats.org/presentationml/2006/main">
+  <p:cSld>
+    <p:spTree>
+      <p:nvGrpSpPr>
+        <p:cNvPr id="1" name=""/>
+        <p:cNvGrpSpPr/>
+        <p:nvPr/>
+      </p:nvGrpSpPr>
+      <p:grpSpPr>
+        <a:xfrm>
+          <a:off x="0" y="0"/>
+          <a:ext cx="0" cy="0"/>
+          <a:chOff x="0" y="0"/>
+          <a:chExt cx="0" cy="0"/>
+        </a:xfrm>
+      </p:grpSpPr>
+      <p:grpSp>
+        <p:nvGrpSpPr>
+          <p:cNvPr id="37" name="Group 36">
+            <a:extLst>
+              <a:ext uri="{FF2B5EF4-FFF2-40B4-BE49-F238E27FC236}">
+                <a16:creationId xmlns:a16="http://schemas.microsoft.com/office/drawing/2014/main" id="{D7055497-23E2-4015-9B3E-FB2097E7C6DD}"/>
+              </a:ext>
+            </a:extLst>
+          </p:cNvPr>
+          <p:cNvGrpSpPr/>
+          <p:nvPr/>
+        </p:nvGrpSpPr>
+        <p:grpSpPr>
+          <a:xfrm>
+            <a:off x="3733800" y="2286318"/>
+            <a:ext cx="8285628" cy="4498631"/>
+            <a:chOff x="3733800" y="2286318"/>
+            <a:chExt cx="8285628" cy="4498631"/>
+          </a:xfrm>
+        </p:grpSpPr>
+        <p:sp>
+          <p:nvSpPr>
+            <p:cNvPr id="4" name="Rectangle: Rounded Corners 3">
+              <a:extLst>
+                <a:ext uri="{FF2B5EF4-FFF2-40B4-BE49-F238E27FC236}">
+                  <a16:creationId xmlns:a16="http://schemas.microsoft.com/office/drawing/2014/main" id="{A56C36EC-49AE-490B-A408-92D8C29052F4}"/>
+                </a:ext>
+              </a:extLst>
+            </p:cNvPr>
+            <p:cNvSpPr/>
+            <p:nvPr/>
+          </p:nvSpPr>
+          <p:spPr>
+            <a:xfrm>
+              <a:off x="4086087" y="4907992"/>
+              <a:ext cx="3038612" cy="861930"/>
+            </a:xfrm>
+            <a:prstGeom prst="roundRect">
+              <a:avLst/>
+            </a:prstGeom>
+            <a:solidFill>
+              <a:schemeClr val="tx1">
+                <a:lumMod val="75000"/>
+                <a:lumOff val="25000"/>
+              </a:schemeClr>
+            </a:solidFill>
+            <a:ln/>
+          </p:spPr>
+          <p:style>
+            <a:lnRef idx="0">
+              <a:schemeClr val="accent1"/>
+            </a:lnRef>
+            <a:fillRef idx="3">
+              <a:schemeClr val="accent1"/>
+            </a:fillRef>
+            <a:effectRef idx="3">
+              <a:schemeClr val="accent1"/>
+            </a:effectRef>
+            <a:fontRef idx="minor">
+              <a:schemeClr val="lt1"/>
+            </a:fontRef>
+          </p:style>
+          <p:txBody>
+            <a:bodyPr rtlCol="0" anchor="t"/>
+            <a:lstStyle/>
+            <a:p>
+              <a:r>
+                <a:rPr lang="en-IN" sz="2400" dirty="0">
+                  <a:latin typeface="Abadi" panose="020B0604020104020204" pitchFamily="34" charset="0"/>
+                </a:rPr>
+                <a:t>Core Platform</a:t>
+              </a:r>
+            </a:p>
+            <a:p>
+              <a:r>
+                <a:rPr lang="en-IN" sz="2400" dirty="0" err="1">
+                  <a:solidFill>
+                    <a:srgbClr val="FFFF00"/>
+                  </a:solidFill>
+                  <a:latin typeface="Abadi" panose="020B0604020104020204" pitchFamily="34" charset="0"/>
+                </a:rPr>
+                <a:t>nxp</a:t>
+              </a:r>
+              <a:r>
+                <a:rPr lang="en-IN" sz="2400" dirty="0">
+                  <a:solidFill>
+                    <a:srgbClr val="FFFF00"/>
+                  </a:solidFill>
+                  <a:latin typeface="Abadi" panose="020B0604020104020204" pitchFamily="34" charset="0"/>
+                </a:rPr>
+                <a:t>-core</a:t>
+              </a:r>
+            </a:p>
+          </p:txBody>
+        </p:sp>
+        <p:sp>
+          <p:nvSpPr>
+            <p:cNvPr id="13" name="Rectangle: Rounded Corners 12">
+              <a:extLst>
+                <a:ext uri="{FF2B5EF4-FFF2-40B4-BE49-F238E27FC236}">
+                  <a16:creationId xmlns:a16="http://schemas.microsoft.com/office/drawing/2014/main" id="{9098A500-6F59-445A-B99E-FAE436F23DAF}"/>
+                </a:ext>
+              </a:extLst>
+            </p:cNvPr>
+            <p:cNvSpPr/>
+            <p:nvPr/>
+          </p:nvSpPr>
+          <p:spPr>
+            <a:xfrm>
+              <a:off x="4086087" y="2792194"/>
+              <a:ext cx="3038613" cy="961332"/>
+            </a:xfrm>
+            <a:prstGeom prst="roundRect">
+              <a:avLst/>
+            </a:prstGeom>
+            <a:solidFill>
+              <a:schemeClr val="tx1">
+                <a:lumMod val="75000"/>
+                <a:lumOff val="25000"/>
+              </a:schemeClr>
+            </a:solidFill>
+            <a:ln/>
+          </p:spPr>
+          <p:style>
+            <a:lnRef idx="0">
+              <a:schemeClr val="accent1"/>
+            </a:lnRef>
+            <a:fillRef idx="3">
+              <a:schemeClr val="accent1"/>
+            </a:fillRef>
+            <a:effectRef idx="3">
+              <a:schemeClr val="accent1"/>
+            </a:effectRef>
+            <a:fontRef idx="minor">
+              <a:schemeClr val="lt1"/>
+            </a:fontRef>
+          </p:style>
+          <p:txBody>
+            <a:bodyPr rtlCol="0" anchor="t"/>
+            <a:lstStyle/>
+            <a:p>
+              <a:r>
+                <a:rPr lang="en-IN" sz="2400" dirty="0">
+                  <a:latin typeface="Abadi" panose="020B0604020104020204" pitchFamily="34" charset="0"/>
+                </a:rPr>
+                <a:t>API Gateway</a:t>
+              </a:r>
+            </a:p>
+            <a:p>
+              <a:r>
+                <a:rPr lang="en-IN" sz="2400" dirty="0" err="1">
+                  <a:solidFill>
+                    <a:srgbClr val="FFFF00"/>
+                  </a:solidFill>
+                  <a:latin typeface="Abadi" panose="020B0604020104020204" pitchFamily="34" charset="0"/>
+                </a:rPr>
+                <a:t>nxp</a:t>
+              </a:r>
+              <a:r>
+                <a:rPr lang="en-IN" sz="2400" dirty="0">
+                  <a:solidFill>
+                    <a:srgbClr val="FFFF00"/>
+                  </a:solidFill>
+                  <a:latin typeface="Abadi" panose="020B0604020104020204" pitchFamily="34" charset="0"/>
+                </a:rPr>
+                <a:t>-server</a:t>
+              </a:r>
+            </a:p>
+          </p:txBody>
+        </p:sp>
+        <p:pic>
+          <p:nvPicPr>
+            <p:cNvPr id="14" name="Picture 6" descr="Related image">
+              <a:extLst>
+                <a:ext uri="{FF2B5EF4-FFF2-40B4-BE49-F238E27FC236}">
+                  <a16:creationId xmlns:a16="http://schemas.microsoft.com/office/drawing/2014/main" id="{A464A646-1BD1-4BBD-859A-D38AF0C33CBF}"/>
+                </a:ext>
+              </a:extLst>
+            </p:cNvPr>
+            <p:cNvPicPr>
+              <a:picLocks noChangeAspect="1" noChangeArrowheads="1"/>
+            </p:cNvPicPr>
+            <p:nvPr/>
+          </p:nvPicPr>
+          <p:blipFill>
+            <a:blip r:embed="rId2" cstate="print">
+              <a:extLst>
+                <a:ext uri="{28A0092B-C50C-407E-A947-70E740481C1C}">
+                  <a14:useLocalDpi xmlns:a14="http://schemas.microsoft.com/office/drawing/2010/main" val="0"/>
+                </a:ext>
+              </a:extLst>
+            </a:blip>
+            <a:srcRect/>
+            <a:stretch>
+              <a:fillRect/>
+            </a:stretch>
+          </p:blipFill>
+          <p:spPr bwMode="auto">
+            <a:xfrm>
+              <a:off x="6139422" y="3227593"/>
+              <a:ext cx="501788" cy="501788"/>
+            </a:xfrm>
+            <a:prstGeom prst="rect">
+              <a:avLst/>
+            </a:prstGeom>
+            <a:noFill/>
+            <a:extLst>
+              <a:ext uri="{909E8E84-426E-40DD-AFC4-6F175D3DCCD1}">
+                <a14:hiddenFill xmlns:a14="http://schemas.microsoft.com/office/drawing/2010/main">
+                  <a:solidFill>
+                    <a:srgbClr val="FFFFFF"/>
+                  </a:solidFill>
+                </a14:hiddenFill>
+              </a:ext>
+            </a:extLst>
+          </p:spPr>
+        </p:pic>
+        <p:pic>
+          <p:nvPicPr>
+            <p:cNvPr id="1026" name="Picture 2" descr="Image result for graphql logo">
+              <a:extLst>
+                <a:ext uri="{FF2B5EF4-FFF2-40B4-BE49-F238E27FC236}">
+                  <a16:creationId xmlns:a16="http://schemas.microsoft.com/office/drawing/2014/main" id="{45C2B0B0-DEED-447A-ABD7-1D17FEBE5846}"/>
+                </a:ext>
+              </a:extLst>
+            </p:cNvPr>
+            <p:cNvPicPr>
+              <a:picLocks noChangeAspect="1" noChangeArrowheads="1"/>
+            </p:cNvPicPr>
+            <p:nvPr/>
+          </p:nvPicPr>
+          <p:blipFill>
+            <a:blip r:embed="rId3" cstate="print">
+              <a:extLst>
+                <a:ext uri="{28A0092B-C50C-407E-A947-70E740481C1C}">
+                  <a14:useLocalDpi xmlns:a14="http://schemas.microsoft.com/office/drawing/2010/main" val="0"/>
+                </a:ext>
+              </a:extLst>
+            </a:blip>
+            <a:srcRect/>
+            <a:stretch>
+              <a:fillRect/>
+            </a:stretch>
+          </p:blipFill>
+          <p:spPr bwMode="auto">
+            <a:xfrm>
+              <a:off x="6668761" y="3313040"/>
+              <a:ext cx="354335" cy="354335"/>
+            </a:xfrm>
+            <a:prstGeom prst="rect">
+              <a:avLst/>
+            </a:prstGeom>
+            <a:noFill/>
+            <a:extLst>
+              <a:ext uri="{909E8E84-426E-40DD-AFC4-6F175D3DCCD1}">
+                <a14:hiddenFill xmlns:a14="http://schemas.microsoft.com/office/drawing/2010/main">
+                  <a:solidFill>
+                    <a:srgbClr val="FFFFFF"/>
+                  </a:solidFill>
+                </a14:hiddenFill>
+              </a:ext>
+            </a:extLst>
+          </p:spPr>
+        </p:pic>
+        <p:sp>
+          <p:nvSpPr>
+            <p:cNvPr id="15" name="Rectangle: Rounded Corners 14">
+              <a:extLst>
+                <a:ext uri="{FF2B5EF4-FFF2-40B4-BE49-F238E27FC236}">
+                  <a16:creationId xmlns:a16="http://schemas.microsoft.com/office/drawing/2014/main" id="{0DD3E88A-6FC9-4A57-B765-43200D549BE2}"/>
+                </a:ext>
+              </a:extLst>
+            </p:cNvPr>
+            <p:cNvSpPr/>
+            <p:nvPr/>
+          </p:nvSpPr>
+          <p:spPr>
+            <a:xfrm>
+              <a:off x="7764928" y="3899794"/>
+              <a:ext cx="3614272" cy="861930"/>
+            </a:xfrm>
+            <a:prstGeom prst="roundRect">
+              <a:avLst/>
+            </a:prstGeom>
+            <a:solidFill>
+              <a:schemeClr val="tx1">
+                <a:lumMod val="75000"/>
+                <a:lumOff val="25000"/>
+              </a:schemeClr>
+            </a:solidFill>
+            <a:ln/>
+          </p:spPr>
+          <p:style>
+            <a:lnRef idx="0">
+              <a:schemeClr val="accent1"/>
+            </a:lnRef>
+            <a:fillRef idx="3">
+              <a:schemeClr val="accent1"/>
+            </a:fillRef>
+            <a:effectRef idx="3">
+              <a:schemeClr val="accent1"/>
+            </a:effectRef>
+            <a:fontRef idx="minor">
+              <a:schemeClr val="lt1"/>
+            </a:fontRef>
+          </p:style>
+          <p:txBody>
+            <a:bodyPr rtlCol="0" anchor="t"/>
+            <a:lstStyle/>
+            <a:p>
+              <a:r>
+                <a:rPr lang="en-IN" sz="2400" dirty="0">
+                  <a:latin typeface="Abadi" panose="020B0604020104020204" pitchFamily="34" charset="0"/>
+                </a:rPr>
+                <a:t>SWAPI </a:t>
+              </a:r>
+              <a:r>
+                <a:rPr lang="en-IN" sz="2400" dirty="0" err="1">
+                  <a:latin typeface="Abadi" panose="020B0604020104020204" pitchFamily="34" charset="0"/>
+                </a:rPr>
+                <a:t>GraphQL</a:t>
+              </a:r>
+              <a:r>
+                <a:rPr lang="en-IN" sz="2400" dirty="0">
+                  <a:latin typeface="Abadi" panose="020B0604020104020204" pitchFamily="34" charset="0"/>
+                </a:rPr>
+                <a:t> Server</a:t>
+              </a:r>
+            </a:p>
+            <a:p>
+              <a:r>
+                <a:rPr lang="en-IN" sz="2400" dirty="0" err="1">
+                  <a:solidFill>
+                    <a:srgbClr val="FFFF00"/>
+                  </a:solidFill>
+                  <a:latin typeface="Abadi" panose="020B0604020104020204" pitchFamily="34" charset="0"/>
+                </a:rPr>
+                <a:t>nxp</a:t>
+              </a:r>
+              <a:r>
+                <a:rPr lang="en-IN" sz="2400" dirty="0">
+                  <a:solidFill>
+                    <a:srgbClr val="FFFF00"/>
+                  </a:solidFill>
+                  <a:latin typeface="Abadi" panose="020B0604020104020204" pitchFamily="34" charset="0"/>
+                </a:rPr>
+                <a:t>-</a:t>
+              </a:r>
+              <a:r>
+                <a:rPr lang="en-IN" sz="2400" dirty="0" err="1">
+                  <a:solidFill>
+                    <a:srgbClr val="FFFF00"/>
+                  </a:solidFill>
+                  <a:latin typeface="Abadi" panose="020B0604020104020204" pitchFamily="34" charset="0"/>
+                </a:rPr>
+                <a:t>swapi</a:t>
+              </a:r>
+              <a:r>
+                <a:rPr lang="en-IN" sz="2400" dirty="0">
+                  <a:solidFill>
+                    <a:srgbClr val="FFFF00"/>
+                  </a:solidFill>
+                  <a:latin typeface="Abadi" panose="020B0604020104020204" pitchFamily="34" charset="0"/>
+                </a:rPr>
+                <a:t>-server</a:t>
+              </a:r>
+            </a:p>
+          </p:txBody>
+        </p:sp>
+        <p:pic>
+          <p:nvPicPr>
+            <p:cNvPr id="16" name="Picture 6" descr="Related image">
+              <a:extLst>
+                <a:ext uri="{FF2B5EF4-FFF2-40B4-BE49-F238E27FC236}">
+                  <a16:creationId xmlns:a16="http://schemas.microsoft.com/office/drawing/2014/main" id="{5BF0BB89-9ED5-4620-9327-6C03302E905C}"/>
+                </a:ext>
+              </a:extLst>
+            </p:cNvPr>
+            <p:cNvPicPr>
+              <a:picLocks noChangeAspect="1" noChangeArrowheads="1"/>
+            </p:cNvPicPr>
+            <p:nvPr/>
+          </p:nvPicPr>
+          <p:blipFill>
+            <a:blip r:embed="rId2" cstate="print">
+              <a:extLst>
+                <a:ext uri="{28A0092B-C50C-407E-A947-70E740481C1C}">
+                  <a14:useLocalDpi xmlns:a14="http://schemas.microsoft.com/office/drawing/2010/main" val="0"/>
+                </a:ext>
+              </a:extLst>
+            </a:blip>
+            <a:srcRect/>
+            <a:stretch>
+              <a:fillRect/>
+            </a:stretch>
+          </p:blipFill>
+          <p:spPr bwMode="auto">
+            <a:xfrm>
+              <a:off x="10442718" y="4257032"/>
+              <a:ext cx="501788" cy="501788"/>
+            </a:xfrm>
+            <a:prstGeom prst="rect">
+              <a:avLst/>
+            </a:prstGeom>
+            <a:noFill/>
+            <a:extLst>
+              <a:ext uri="{909E8E84-426E-40DD-AFC4-6F175D3DCCD1}">
+                <a14:hiddenFill xmlns:a14="http://schemas.microsoft.com/office/drawing/2010/main">
+                  <a:solidFill>
+                    <a:srgbClr val="FFFFFF"/>
+                  </a:solidFill>
+                </a14:hiddenFill>
+              </a:ext>
+            </a:extLst>
+          </p:spPr>
+        </p:pic>
+        <p:pic>
+          <p:nvPicPr>
+            <p:cNvPr id="17" name="Picture 2" descr="Image result for graphql logo">
+              <a:extLst>
+                <a:ext uri="{FF2B5EF4-FFF2-40B4-BE49-F238E27FC236}">
+                  <a16:creationId xmlns:a16="http://schemas.microsoft.com/office/drawing/2014/main" id="{6FC64241-3275-4160-ABFF-379E12363D69}"/>
+                </a:ext>
+              </a:extLst>
+            </p:cNvPr>
+            <p:cNvPicPr>
+              <a:picLocks noChangeAspect="1" noChangeArrowheads="1"/>
+            </p:cNvPicPr>
+            <p:nvPr/>
+          </p:nvPicPr>
+          <p:blipFill>
+            <a:blip r:embed="rId3" cstate="print">
+              <a:extLst>
+                <a:ext uri="{28A0092B-C50C-407E-A947-70E740481C1C}">
+                  <a14:useLocalDpi xmlns:a14="http://schemas.microsoft.com/office/drawing/2010/main" val="0"/>
+                </a:ext>
+              </a:extLst>
+            </a:blip>
+            <a:srcRect/>
+            <a:stretch>
+              <a:fillRect/>
+            </a:stretch>
+          </p:blipFill>
+          <p:spPr bwMode="auto">
+            <a:xfrm>
+              <a:off x="10944506" y="4330759"/>
+              <a:ext cx="354335" cy="354335"/>
+            </a:xfrm>
+            <a:prstGeom prst="rect">
+              <a:avLst/>
+            </a:prstGeom>
+            <a:noFill/>
+            <a:extLst>
+              <a:ext uri="{909E8E84-426E-40DD-AFC4-6F175D3DCCD1}">
+                <a14:hiddenFill xmlns:a14="http://schemas.microsoft.com/office/drawing/2010/main">
+                  <a:solidFill>
+                    <a:srgbClr val="FFFFFF"/>
+                  </a:solidFill>
+                </a14:hiddenFill>
+              </a:ext>
+            </a:extLst>
+          </p:spPr>
+        </p:pic>
+        <p:pic>
+          <p:nvPicPr>
+            <p:cNvPr id="18" name="Picture 6" descr="Related image">
+              <a:extLst>
+                <a:ext uri="{FF2B5EF4-FFF2-40B4-BE49-F238E27FC236}">
+                  <a16:creationId xmlns:a16="http://schemas.microsoft.com/office/drawing/2014/main" id="{8E4477D0-781C-4EB3-A586-72BE8D175443}"/>
+                </a:ext>
+              </a:extLst>
+            </p:cNvPr>
+            <p:cNvPicPr>
+              <a:picLocks noChangeAspect="1" noChangeArrowheads="1"/>
+            </p:cNvPicPr>
+            <p:nvPr/>
+          </p:nvPicPr>
+          <p:blipFill>
+            <a:blip r:embed="rId2" cstate="print">
+              <a:extLst>
+                <a:ext uri="{28A0092B-C50C-407E-A947-70E740481C1C}">
+                  <a14:useLocalDpi xmlns:a14="http://schemas.microsoft.com/office/drawing/2010/main" val="0"/>
+                </a:ext>
+              </a:extLst>
+            </a:blip>
+            <a:srcRect/>
+            <a:stretch>
+              <a:fillRect/>
+            </a:stretch>
+          </p:blipFill>
+          <p:spPr bwMode="auto">
+            <a:xfrm>
+              <a:off x="6066630" y="5268134"/>
+              <a:ext cx="501788" cy="501788"/>
+            </a:xfrm>
+            <a:prstGeom prst="rect">
+              <a:avLst/>
+            </a:prstGeom>
+            <a:noFill/>
+            <a:extLst>
+              <a:ext uri="{909E8E84-426E-40DD-AFC4-6F175D3DCCD1}">
+                <a14:hiddenFill xmlns:a14="http://schemas.microsoft.com/office/drawing/2010/main">
+                  <a:solidFill>
+                    <a:srgbClr val="FFFFFF"/>
+                  </a:solidFill>
+                </a14:hiddenFill>
+              </a:ext>
+            </a:extLst>
+          </p:spPr>
+        </p:pic>
+        <p:pic>
+          <p:nvPicPr>
+            <p:cNvPr id="19" name="Picture 2" descr="Image result for graphql logo">
+              <a:extLst>
+                <a:ext uri="{FF2B5EF4-FFF2-40B4-BE49-F238E27FC236}">
+                  <a16:creationId xmlns:a16="http://schemas.microsoft.com/office/drawing/2014/main" id="{F412F4AD-CF1B-4D49-B01D-B5B943634C88}"/>
+                </a:ext>
+              </a:extLst>
+            </p:cNvPr>
+            <p:cNvPicPr>
+              <a:picLocks noChangeAspect="1" noChangeArrowheads="1"/>
+            </p:cNvPicPr>
+            <p:nvPr/>
+          </p:nvPicPr>
+          <p:blipFill>
+            <a:blip r:embed="rId3" cstate="print">
+              <a:extLst>
+                <a:ext uri="{28A0092B-C50C-407E-A947-70E740481C1C}">
+                  <a14:useLocalDpi xmlns:a14="http://schemas.microsoft.com/office/drawing/2010/main" val="0"/>
+                </a:ext>
+              </a:extLst>
+            </a:blip>
+            <a:srcRect/>
+            <a:stretch>
+              <a:fillRect/>
+            </a:stretch>
+          </p:blipFill>
+          <p:spPr bwMode="auto">
+            <a:xfrm>
+              <a:off x="6567161" y="5341860"/>
+              <a:ext cx="354335" cy="354335"/>
+            </a:xfrm>
+            <a:prstGeom prst="rect">
+              <a:avLst/>
+            </a:prstGeom>
+            <a:noFill/>
+            <a:extLst>
+              <a:ext uri="{909E8E84-426E-40DD-AFC4-6F175D3DCCD1}">
+                <a14:hiddenFill xmlns:a14="http://schemas.microsoft.com/office/drawing/2010/main">
+                  <a:solidFill>
+                    <a:srgbClr val="FFFFFF"/>
+                  </a:solidFill>
+                </a14:hiddenFill>
+              </a:ext>
+            </a:extLst>
+          </p:spPr>
+        </p:pic>
+        <p:cxnSp>
+          <p:nvCxnSpPr>
+            <p:cNvPr id="11" name="Connector: Curved 10">
+              <a:extLst>
+                <a:ext uri="{FF2B5EF4-FFF2-40B4-BE49-F238E27FC236}">
+                  <a16:creationId xmlns:a16="http://schemas.microsoft.com/office/drawing/2014/main" id="{7871D555-E223-4255-9CA8-E85F264C9F2A}"/>
+                </a:ext>
+              </a:extLst>
+            </p:cNvPr>
+            <p:cNvCxnSpPr>
+              <a:stCxn id="13" idx="3"/>
+              <a:endCxn id="15" idx="0"/>
+            </p:cNvCxnSpPr>
+            <p:nvPr/>
+          </p:nvCxnSpPr>
+          <p:spPr>
+            <a:xfrm>
+              <a:off x="7124700" y="3272860"/>
+              <a:ext cx="2447364" cy="626934"/>
+            </a:xfrm>
+            <a:prstGeom prst="curvedConnector2">
+              <a:avLst/>
+            </a:prstGeom>
+            <a:ln w="28575">
+              <a:headEnd type="none" w="med" len="med"/>
+              <a:tailEnd type="triangle" w="med" len="med"/>
+            </a:ln>
+          </p:spPr>
+          <p:style>
+            <a:lnRef idx="1">
+              <a:schemeClr val="accent1"/>
+            </a:lnRef>
+            <a:fillRef idx="0">
+              <a:schemeClr val="accent1"/>
+            </a:fillRef>
+            <a:effectRef idx="0">
+              <a:schemeClr val="accent1"/>
+            </a:effectRef>
+            <a:fontRef idx="minor">
+              <a:schemeClr val="tx1"/>
+            </a:fontRef>
+          </p:style>
+        </p:cxnSp>
+        <p:cxnSp>
+          <p:nvCxnSpPr>
+            <p:cNvPr id="21" name="Connector: Curved 20">
+              <a:extLst>
+                <a:ext uri="{FF2B5EF4-FFF2-40B4-BE49-F238E27FC236}">
+                  <a16:creationId xmlns:a16="http://schemas.microsoft.com/office/drawing/2014/main" id="{A551F451-843C-4907-B272-9A4A7A789D52}"/>
+                </a:ext>
+              </a:extLst>
+            </p:cNvPr>
+            <p:cNvCxnSpPr>
+              <a:stCxn id="13" idx="2"/>
+              <a:endCxn id="4" idx="0"/>
+            </p:cNvCxnSpPr>
+            <p:nvPr/>
+          </p:nvCxnSpPr>
+          <p:spPr>
+            <a:xfrm rot="5400000">
+              <a:off x="5028161" y="4330759"/>
+              <a:ext cx="1154466" cy="1"/>
+            </a:xfrm>
+            <a:prstGeom prst="curvedConnector3">
+              <a:avLst/>
+            </a:prstGeom>
+            <a:ln w="28575">
+              <a:tailEnd type="triangle"/>
+            </a:ln>
+          </p:spPr>
+          <p:style>
+            <a:lnRef idx="1">
+              <a:schemeClr val="accent1"/>
+            </a:lnRef>
+            <a:fillRef idx="0">
+              <a:schemeClr val="accent1"/>
+            </a:fillRef>
+            <a:effectRef idx="0">
+              <a:schemeClr val="accent1"/>
+            </a:effectRef>
+            <a:fontRef idx="minor">
+              <a:schemeClr val="tx1"/>
+            </a:fontRef>
+          </p:style>
+        </p:cxnSp>
+        <p:cxnSp>
+          <p:nvCxnSpPr>
+            <p:cNvPr id="23" name="Connector: Curved 22">
+              <a:extLst>
+                <a:ext uri="{FF2B5EF4-FFF2-40B4-BE49-F238E27FC236}">
+                  <a16:creationId xmlns:a16="http://schemas.microsoft.com/office/drawing/2014/main" id="{E1C4A6B8-C909-4445-B25E-A69899C5BC4A}"/>
+                </a:ext>
+              </a:extLst>
+            </p:cNvPr>
+            <p:cNvCxnSpPr>
+              <a:stCxn id="15" idx="1"/>
+              <a:endCxn id="4" idx="3"/>
+            </p:cNvCxnSpPr>
+            <p:nvPr/>
+          </p:nvCxnSpPr>
+          <p:spPr>
+            <a:xfrm rot="10800000" flipV="1">
+              <a:off x="7124700" y="4330759"/>
+              <a:ext cx="640229" cy="1008198"/>
+            </a:xfrm>
+            <a:prstGeom prst="curvedConnector3">
+              <a:avLst/>
+            </a:prstGeom>
+            <a:ln w="28575">
+              <a:tailEnd type="triangle"/>
+            </a:ln>
+          </p:spPr>
+          <p:style>
+            <a:lnRef idx="1">
+              <a:schemeClr val="accent1"/>
+            </a:lnRef>
+            <a:fillRef idx="0">
+              <a:schemeClr val="accent1"/>
+            </a:fillRef>
+            <a:effectRef idx="0">
+              <a:schemeClr val="accent1"/>
+            </a:effectRef>
+            <a:fontRef idx="minor">
+              <a:schemeClr val="tx1"/>
+            </a:fontRef>
+          </p:style>
+        </p:cxnSp>
+        <p:sp>
+          <p:nvSpPr>
+            <p:cNvPr id="26" name="TextBox 25">
+              <a:extLst>
+                <a:ext uri="{FF2B5EF4-FFF2-40B4-BE49-F238E27FC236}">
+                  <a16:creationId xmlns:a16="http://schemas.microsoft.com/office/drawing/2014/main" id="{7C1D669F-7CC9-477A-8CF1-62391AF62297}"/>
+                </a:ext>
+              </a:extLst>
+            </p:cNvPr>
+            <p:cNvSpPr txBox="1"/>
+            <p:nvPr/>
+          </p:nvSpPr>
+          <p:spPr>
+            <a:xfrm>
+              <a:off x="7170145" y="2844667"/>
+              <a:ext cx="2870200" cy="369332"/>
+            </a:xfrm>
+            <a:prstGeom prst="rect">
+              <a:avLst/>
+            </a:prstGeom>
+            <a:noFill/>
+          </p:spPr>
+          <p:txBody>
+            <a:bodyPr wrap="square" rtlCol="0">
+              <a:spAutoFit/>
+            </a:bodyPr>
+            <a:lstStyle>
+              <a:defPPr>
+                <a:defRPr lang="en-US"/>
+              </a:defPPr>
+              <a:lvl1pPr>
+                <a:defRPr>
+                  <a:latin typeface="Abadi Extra Light" panose="020B0204020104020204" pitchFamily="34" charset="0"/>
+                </a:defRPr>
+              </a:lvl1pPr>
+            </a:lstStyle>
+            <a:p>
+              <a:r>
+                <a:rPr lang="en-IN" dirty="0" err="1"/>
+                <a:t>Graphql</a:t>
+              </a:r>
+              <a:r>
+                <a:rPr lang="en-IN" dirty="0"/>
+                <a:t> Schema Stitching</a:t>
+              </a:r>
+            </a:p>
+          </p:txBody>
+        </p:sp>
+        <p:sp>
+          <p:nvSpPr>
+            <p:cNvPr id="29" name="TextBox 28">
+              <a:extLst>
+                <a:ext uri="{FF2B5EF4-FFF2-40B4-BE49-F238E27FC236}">
+                  <a16:creationId xmlns:a16="http://schemas.microsoft.com/office/drawing/2014/main" id="{348A8536-23E9-4D85-82E2-16CC0D01F2B0}"/>
+                </a:ext>
+              </a:extLst>
+            </p:cNvPr>
+            <p:cNvSpPr txBox="1"/>
+            <p:nvPr/>
+          </p:nvSpPr>
+          <p:spPr>
+            <a:xfrm>
+              <a:off x="9411450" y="3342666"/>
+              <a:ext cx="1815350" cy="369332"/>
+            </a:xfrm>
+            <a:prstGeom prst="rect">
+              <a:avLst/>
+            </a:prstGeom>
+            <a:noFill/>
+          </p:spPr>
+          <p:txBody>
+            <a:bodyPr wrap="square" rtlCol="0">
+              <a:spAutoFit/>
+            </a:bodyPr>
+            <a:lstStyle>
+              <a:defPPr>
+                <a:defRPr lang="en-US"/>
+              </a:defPPr>
+              <a:lvl1pPr>
+                <a:defRPr>
+                  <a:latin typeface="Abadi Extra Light" panose="020B0204020104020204" pitchFamily="34" charset="0"/>
+                </a:defRPr>
+              </a:lvl1pPr>
+            </a:lstStyle>
+            <a:p>
+              <a:r>
+                <a:rPr lang="en-IN" dirty="0"/>
+                <a:t>Remote schema</a:t>
+              </a:r>
+            </a:p>
+          </p:txBody>
+        </p:sp>
+        <p:sp>
+          <p:nvSpPr>
+            <p:cNvPr id="32" name="TextBox 31">
+              <a:extLst>
+                <a:ext uri="{FF2B5EF4-FFF2-40B4-BE49-F238E27FC236}">
+                  <a16:creationId xmlns:a16="http://schemas.microsoft.com/office/drawing/2014/main" id="{82338C39-CDB0-40DB-AD98-BF7B3A041AD2}"/>
+                </a:ext>
+              </a:extLst>
+            </p:cNvPr>
+            <p:cNvSpPr txBox="1"/>
+            <p:nvPr/>
+          </p:nvSpPr>
+          <p:spPr>
+            <a:xfrm>
+              <a:off x="3962137" y="3930790"/>
+              <a:ext cx="1815350" cy="369332"/>
+            </a:xfrm>
+            <a:prstGeom prst="rect">
+              <a:avLst/>
+            </a:prstGeom>
+            <a:noFill/>
+          </p:spPr>
+          <p:txBody>
+            <a:bodyPr wrap="square" rtlCol="0">
+              <a:spAutoFit/>
+            </a:bodyPr>
+            <a:lstStyle/>
+            <a:p>
+              <a:r>
+                <a:rPr lang="en-IN" dirty="0">
+                  <a:latin typeface="Abadi Extra Light" panose="020B0204020104020204" pitchFamily="34" charset="0"/>
+                </a:rPr>
+                <a:t>Depends on</a:t>
+              </a:r>
+            </a:p>
+          </p:txBody>
+        </p:sp>
+        <p:sp>
+          <p:nvSpPr>
+            <p:cNvPr id="33" name="TextBox 32">
+              <a:extLst>
+                <a:ext uri="{FF2B5EF4-FFF2-40B4-BE49-F238E27FC236}">
+                  <a16:creationId xmlns:a16="http://schemas.microsoft.com/office/drawing/2014/main" id="{5A256963-7EF9-4B81-BE14-2DBD3C7C985B}"/>
+                </a:ext>
+              </a:extLst>
+            </p:cNvPr>
+            <p:cNvSpPr txBox="1"/>
+            <p:nvPr/>
+          </p:nvSpPr>
+          <p:spPr>
+            <a:xfrm>
+              <a:off x="7533125" y="4975355"/>
+              <a:ext cx="1815350" cy="369332"/>
+            </a:xfrm>
+            <a:prstGeom prst="rect">
+              <a:avLst/>
+            </a:prstGeom>
+            <a:noFill/>
+          </p:spPr>
+          <p:txBody>
+            <a:bodyPr wrap="square" rtlCol="0">
+              <a:spAutoFit/>
+            </a:bodyPr>
+            <a:lstStyle>
+              <a:defPPr>
+                <a:defRPr lang="en-US"/>
+              </a:defPPr>
+              <a:lvl1pPr>
+                <a:defRPr>
+                  <a:latin typeface="Abadi Extra Light" panose="020B0204020104020204" pitchFamily="34" charset="0"/>
+                </a:defRPr>
+              </a:lvl1pPr>
+            </a:lstStyle>
+            <a:p>
+              <a:r>
+                <a:rPr lang="en-IN" dirty="0"/>
+                <a:t>Depends on</a:t>
+              </a:r>
+            </a:p>
+          </p:txBody>
+        </p:sp>
+        <p:sp>
+          <p:nvSpPr>
+            <p:cNvPr id="30" name="TextBox 29">
+              <a:extLst>
+                <a:ext uri="{FF2B5EF4-FFF2-40B4-BE49-F238E27FC236}">
+                  <a16:creationId xmlns:a16="http://schemas.microsoft.com/office/drawing/2014/main" id="{FB4554A2-C884-4D82-96AF-97780A9EFFC1}"/>
+                </a:ext>
+              </a:extLst>
+            </p:cNvPr>
+            <p:cNvSpPr txBox="1"/>
+            <p:nvPr/>
+          </p:nvSpPr>
+          <p:spPr>
+            <a:xfrm>
+              <a:off x="6206751" y="2833244"/>
+              <a:ext cx="868917" cy="276999"/>
+            </a:xfrm>
+            <a:prstGeom prst="rect">
+              <a:avLst/>
+            </a:prstGeom>
+            <a:noFill/>
+          </p:spPr>
+          <p:txBody>
+            <a:bodyPr wrap="square" rtlCol="0">
+              <a:spAutoFit/>
+            </a:bodyPr>
+            <a:lstStyle/>
+            <a:p>
+              <a:r>
+                <a:rPr lang="en-IN" sz="1200" dirty="0">
+                  <a:solidFill>
+                    <a:schemeClr val="bg1"/>
+                  </a:solidFill>
+                  <a:latin typeface="Abadi Extra Light" panose="020B0204020104020204" pitchFamily="34" charset="0"/>
+                </a:rPr>
+                <a:t>Workspace</a:t>
+              </a:r>
+            </a:p>
+          </p:txBody>
+        </p:sp>
+        <p:sp>
+          <p:nvSpPr>
+            <p:cNvPr id="35" name="TextBox 34">
+              <a:extLst>
+                <a:ext uri="{FF2B5EF4-FFF2-40B4-BE49-F238E27FC236}">
+                  <a16:creationId xmlns:a16="http://schemas.microsoft.com/office/drawing/2014/main" id="{8D3F2A40-C8B1-401C-9544-C7F8E0A3B9EF}"/>
+                </a:ext>
+              </a:extLst>
+            </p:cNvPr>
+            <p:cNvSpPr txBox="1"/>
+            <p:nvPr/>
+          </p:nvSpPr>
+          <p:spPr>
+            <a:xfrm>
+              <a:off x="6255782" y="4916724"/>
+              <a:ext cx="868917" cy="276999"/>
+            </a:xfrm>
+            <a:prstGeom prst="rect">
+              <a:avLst/>
+            </a:prstGeom>
+            <a:noFill/>
+          </p:spPr>
+          <p:txBody>
+            <a:bodyPr wrap="square" rtlCol="0">
+              <a:spAutoFit/>
+            </a:bodyPr>
+            <a:lstStyle/>
+            <a:p>
+              <a:r>
+                <a:rPr lang="en-IN" sz="1200" dirty="0">
+                  <a:solidFill>
+                    <a:schemeClr val="bg1"/>
+                  </a:solidFill>
+                  <a:latin typeface="Abadi Extra Light" panose="020B0204020104020204" pitchFamily="34" charset="0"/>
+                </a:rPr>
+                <a:t>Workspace</a:t>
+              </a:r>
+            </a:p>
+          </p:txBody>
+        </p:sp>
+        <p:sp>
+          <p:nvSpPr>
+            <p:cNvPr id="36" name="TextBox 35">
+              <a:extLst>
+                <a:ext uri="{FF2B5EF4-FFF2-40B4-BE49-F238E27FC236}">
+                  <a16:creationId xmlns:a16="http://schemas.microsoft.com/office/drawing/2014/main" id="{9328048D-D6DC-470B-A2B2-207DAE7E7AEF}"/>
+                </a:ext>
+              </a:extLst>
+            </p:cNvPr>
+            <p:cNvSpPr txBox="1"/>
+            <p:nvPr/>
+          </p:nvSpPr>
+          <p:spPr>
+            <a:xfrm>
+              <a:off x="10524751" y="3877713"/>
+              <a:ext cx="868917" cy="276999"/>
+            </a:xfrm>
+            <a:prstGeom prst="rect">
+              <a:avLst/>
+            </a:prstGeom>
+            <a:noFill/>
+          </p:spPr>
+          <p:txBody>
+            <a:bodyPr wrap="square" rtlCol="0">
+              <a:spAutoFit/>
+            </a:bodyPr>
+            <a:lstStyle/>
+            <a:p>
+              <a:r>
+                <a:rPr lang="en-IN" sz="1200" dirty="0">
+                  <a:solidFill>
+                    <a:schemeClr val="bg1"/>
+                  </a:solidFill>
+                  <a:latin typeface="Abadi Extra Light" panose="020B0204020104020204" pitchFamily="34" charset="0"/>
+                </a:rPr>
+                <a:t>Workspace</a:t>
+              </a:r>
+            </a:p>
+          </p:txBody>
+        </p:sp>
+        <p:sp>
+          <p:nvSpPr>
+            <p:cNvPr id="31" name="Rectangle: Rounded Corners 30">
+              <a:extLst>
+                <a:ext uri="{FF2B5EF4-FFF2-40B4-BE49-F238E27FC236}">
+                  <a16:creationId xmlns:a16="http://schemas.microsoft.com/office/drawing/2014/main" id="{345D5730-DC0B-4DFC-B61B-8480856F6442}"/>
+                </a:ext>
+              </a:extLst>
+            </p:cNvPr>
+            <p:cNvSpPr/>
+            <p:nvPr/>
+          </p:nvSpPr>
+          <p:spPr>
+            <a:xfrm>
+              <a:off x="3733800" y="2311400"/>
+              <a:ext cx="8140700" cy="4394200"/>
+            </a:xfrm>
+            <a:prstGeom prst="roundRect">
+              <a:avLst/>
+            </a:prstGeom>
+            <a:noFill/>
+          </p:spPr>
+          <p:style>
+            <a:lnRef idx="2">
+              <a:schemeClr val="accent5"/>
+            </a:lnRef>
+            <a:fillRef idx="1">
+              <a:schemeClr val="lt1"/>
+            </a:fillRef>
+            <a:effectRef idx="0">
+              <a:schemeClr val="accent5"/>
+            </a:effectRef>
+            <a:fontRef idx="minor">
+              <a:schemeClr val="dk1"/>
+            </a:fontRef>
+          </p:style>
+          <p:txBody>
+            <a:bodyPr rtlCol="0" anchor="ctr"/>
+            <a:lstStyle/>
+            <a:p>
+              <a:pPr algn="ctr"/>
+              <a:endParaRPr lang="en-IN"/>
+            </a:p>
+          </p:txBody>
+        </p:sp>
+        <p:pic>
+          <p:nvPicPr>
+            <p:cNvPr id="1032" name="Picture 8" descr="Image result for lerna logo">
+              <a:extLst>
+                <a:ext uri="{FF2B5EF4-FFF2-40B4-BE49-F238E27FC236}">
+                  <a16:creationId xmlns:a16="http://schemas.microsoft.com/office/drawing/2014/main" id="{1E17A6DC-F784-4361-84CD-143281F86D28}"/>
+                </a:ext>
+              </a:extLst>
+            </p:cNvPr>
+            <p:cNvPicPr>
+              <a:picLocks noChangeAspect="1" noChangeArrowheads="1"/>
+            </p:cNvPicPr>
+            <p:nvPr/>
+          </p:nvPicPr>
+          <p:blipFill>
+            <a:blip r:embed="rId4" cstate="print">
+              <a:extLst>
+                <a:ext uri="{28A0092B-C50C-407E-A947-70E740481C1C}">
+                  <a14:useLocalDpi xmlns:a14="http://schemas.microsoft.com/office/drawing/2010/main" val="0"/>
+                </a:ext>
+              </a:extLst>
+            </a:blip>
+            <a:srcRect/>
+            <a:stretch>
+              <a:fillRect/>
+            </a:stretch>
+          </p:blipFill>
+          <p:spPr bwMode="auto">
+            <a:xfrm>
+              <a:off x="5384459" y="6052288"/>
+              <a:ext cx="580571" cy="524920"/>
+            </a:xfrm>
+            <a:prstGeom prst="rect">
+              <a:avLst/>
+            </a:prstGeom>
+            <a:noFill/>
+            <a:extLst>
+              <a:ext uri="{909E8E84-426E-40DD-AFC4-6F175D3DCCD1}">
+                <a14:hiddenFill xmlns:a14="http://schemas.microsoft.com/office/drawing/2010/main">
+                  <a:solidFill>
+                    <a:srgbClr val="FFFFFF"/>
+                  </a:solidFill>
+                </a14:hiddenFill>
+              </a:ext>
+            </a:extLst>
+          </p:spPr>
+        </p:pic>
+        <p:pic>
+          <p:nvPicPr>
+            <p:cNvPr id="1034" name="Picture 10" descr="Related image">
+              <a:extLst>
+                <a:ext uri="{FF2B5EF4-FFF2-40B4-BE49-F238E27FC236}">
+                  <a16:creationId xmlns:a16="http://schemas.microsoft.com/office/drawing/2014/main" id="{B6E5E04F-B94E-409F-BC82-B9BA3051F855}"/>
+                </a:ext>
+              </a:extLst>
+            </p:cNvPr>
+            <p:cNvPicPr>
+              <a:picLocks noChangeAspect="1" noChangeArrowheads="1"/>
+            </p:cNvPicPr>
+            <p:nvPr/>
+          </p:nvPicPr>
+          <p:blipFill>
+            <a:blip r:embed="rId5" cstate="print">
+              <a:extLst>
+                <a:ext uri="{28A0092B-C50C-407E-A947-70E740481C1C}">
+                  <a14:useLocalDpi xmlns:a14="http://schemas.microsoft.com/office/drawing/2010/main" val="0"/>
+                </a:ext>
+              </a:extLst>
+            </a:blip>
+            <a:srcRect/>
+            <a:stretch>
+              <a:fillRect/>
+            </a:stretch>
+          </p:blipFill>
+          <p:spPr bwMode="auto">
+            <a:xfrm>
+              <a:off x="7746826" y="6071708"/>
+              <a:ext cx="540657" cy="540657"/>
+            </a:xfrm>
+            <a:prstGeom prst="rect">
+              <a:avLst/>
+            </a:prstGeom>
+            <a:noFill/>
+            <a:extLst>
+              <a:ext uri="{909E8E84-426E-40DD-AFC4-6F175D3DCCD1}">
+                <a14:hiddenFill xmlns:a14="http://schemas.microsoft.com/office/drawing/2010/main">
+                  <a:solidFill>
+                    <a:srgbClr val="FFFFFF"/>
+                  </a:solidFill>
+                </a14:hiddenFill>
+              </a:ext>
+            </a:extLst>
+          </p:spPr>
+        </p:pic>
+        <p:sp>
+          <p:nvSpPr>
+            <p:cNvPr id="40" name="TextBox 39">
+              <a:extLst>
+                <a:ext uri="{FF2B5EF4-FFF2-40B4-BE49-F238E27FC236}">
+                  <a16:creationId xmlns:a16="http://schemas.microsoft.com/office/drawing/2014/main" id="{E70EBF42-8E80-4B88-8EBC-EEDE5DEE7602}"/>
+                </a:ext>
+              </a:extLst>
+            </p:cNvPr>
+            <p:cNvSpPr txBox="1"/>
+            <p:nvPr/>
+          </p:nvSpPr>
+          <p:spPr>
+            <a:xfrm>
+              <a:off x="4290166" y="6163228"/>
+              <a:ext cx="1430663" cy="461665"/>
+            </a:xfrm>
+            <a:prstGeom prst="rect">
+              <a:avLst/>
+            </a:prstGeom>
+            <a:noFill/>
+          </p:spPr>
+          <p:txBody>
+            <a:bodyPr wrap="square" rtlCol="0">
+              <a:spAutoFit/>
+            </a:bodyPr>
+            <a:lstStyle/>
+            <a:p>
+              <a:r>
+                <a:rPr lang="en-IN" sz="1200" dirty="0">
+                  <a:solidFill>
+                    <a:srgbClr val="4472C4"/>
+                  </a:solidFill>
+                  <a:latin typeface="Abadi Extra Light" panose="020B0204020104020204" pitchFamily="34" charset="0"/>
+                </a:rPr>
+                <a:t>WORKFLOW MANAGEMENT</a:t>
+              </a:r>
+            </a:p>
+          </p:txBody>
+        </p:sp>
+        <p:sp>
+          <p:nvSpPr>
+            <p:cNvPr id="41" name="TextBox 40">
+              <a:extLst>
+                <a:ext uri="{FF2B5EF4-FFF2-40B4-BE49-F238E27FC236}">
+                  <a16:creationId xmlns:a16="http://schemas.microsoft.com/office/drawing/2014/main" id="{18DC5C75-692B-4F55-8860-22F010E3E68F}"/>
+                </a:ext>
+              </a:extLst>
+            </p:cNvPr>
+            <p:cNvSpPr txBox="1"/>
+            <p:nvPr/>
+          </p:nvSpPr>
+          <p:spPr>
+            <a:xfrm>
+              <a:off x="6641209" y="6146959"/>
+              <a:ext cx="1277343" cy="461665"/>
+            </a:xfrm>
+            <a:prstGeom prst="rect">
+              <a:avLst/>
+            </a:prstGeom>
+            <a:noFill/>
+          </p:spPr>
+          <p:txBody>
+            <a:bodyPr wrap="square" rtlCol="0">
+              <a:spAutoFit/>
+            </a:bodyPr>
+            <a:lstStyle>
+              <a:defPPr>
+                <a:defRPr lang="en-US"/>
+              </a:defPPr>
+              <a:lvl1pPr>
+                <a:defRPr sz="1200">
+                  <a:solidFill>
+                    <a:srgbClr val="4472C4"/>
+                  </a:solidFill>
+                  <a:latin typeface="Abadi Extra Light" panose="020B0204020104020204" pitchFamily="34" charset="0"/>
+                </a:defRPr>
+              </a:lvl1pPr>
+            </a:lstStyle>
+            <a:p>
+              <a:r>
+                <a:rPr lang="en-IN" dirty="0"/>
+                <a:t>DEPENDENCY MANAGEMENT</a:t>
+              </a:r>
+            </a:p>
+          </p:txBody>
+        </p:sp>
+        <p:sp>
+          <p:nvSpPr>
+            <p:cNvPr id="42" name="TextBox 41">
+              <a:extLst>
+                <a:ext uri="{FF2B5EF4-FFF2-40B4-BE49-F238E27FC236}">
+                  <a16:creationId xmlns:a16="http://schemas.microsoft.com/office/drawing/2014/main" id="{152D9FB0-616E-4098-A1C2-25F4456C8A58}"/>
+                </a:ext>
+              </a:extLst>
+            </p:cNvPr>
+            <p:cNvSpPr txBox="1"/>
+            <p:nvPr/>
+          </p:nvSpPr>
+          <p:spPr>
+            <a:xfrm>
+              <a:off x="9755370" y="4765590"/>
+              <a:ext cx="2264058" cy="338554"/>
+            </a:xfrm>
+            <a:prstGeom prst="rect">
+              <a:avLst/>
+            </a:prstGeom>
+            <a:noFill/>
+          </p:spPr>
+          <p:txBody>
+            <a:bodyPr wrap="square" rtlCol="0">
+              <a:spAutoFit/>
+            </a:bodyPr>
+            <a:lstStyle>
+              <a:defPPr>
+                <a:defRPr lang="en-US"/>
+              </a:defPPr>
+              <a:lvl1pPr>
+                <a:defRPr>
+                  <a:latin typeface="Abadi Extra Light" panose="020B0204020104020204" pitchFamily="34" charset="0"/>
+                </a:defRPr>
+              </a:lvl1pPr>
+            </a:lstStyle>
+            <a:p>
+              <a:r>
+                <a:rPr lang="en-IN" sz="1600" i="1" dirty="0">
+                  <a:solidFill>
+                    <a:schemeClr val="accent1">
+                      <a:lumMod val="75000"/>
+                    </a:schemeClr>
+                  </a:solidFill>
+                </a:rPr>
+                <a:t>people, planets, </a:t>
+              </a:r>
+              <a:r>
+                <a:rPr lang="en-IN" sz="1600" i="1" dirty="0" err="1">
+                  <a:solidFill>
+                    <a:schemeClr val="accent1">
+                      <a:lumMod val="75000"/>
+                    </a:schemeClr>
+                  </a:solidFill>
+                </a:rPr>
+                <a:t>starship</a:t>
+              </a:r>
+              <a:endParaRPr lang="en-IN" sz="1600" i="1" dirty="0">
+                <a:solidFill>
+                  <a:schemeClr val="accent1">
+                    <a:lumMod val="75000"/>
+                  </a:schemeClr>
+                </a:solidFill>
+              </a:endParaRPr>
+            </a:p>
+          </p:txBody>
+        </p:sp>
+        <p:sp>
+          <p:nvSpPr>
+            <p:cNvPr id="43" name="TextBox 42">
+              <a:extLst>
+                <a:ext uri="{FF2B5EF4-FFF2-40B4-BE49-F238E27FC236}">
+                  <a16:creationId xmlns:a16="http://schemas.microsoft.com/office/drawing/2014/main" id="{0823836E-A282-4135-AAA0-1CFD104099A9}"/>
+                </a:ext>
+              </a:extLst>
+            </p:cNvPr>
+            <p:cNvSpPr txBox="1"/>
+            <p:nvPr/>
+          </p:nvSpPr>
+          <p:spPr>
+            <a:xfrm>
+              <a:off x="4142226" y="2442731"/>
+              <a:ext cx="3390899" cy="338554"/>
+            </a:xfrm>
+            <a:prstGeom prst="rect">
+              <a:avLst/>
+            </a:prstGeom>
+            <a:noFill/>
+          </p:spPr>
+          <p:txBody>
+            <a:bodyPr wrap="square" rtlCol="0">
+              <a:spAutoFit/>
+            </a:bodyPr>
+            <a:lstStyle>
+              <a:defPPr>
+                <a:defRPr lang="en-US"/>
+              </a:defPPr>
+              <a:lvl1pPr>
+                <a:defRPr>
+                  <a:latin typeface="Abadi Extra Light" panose="020B0204020104020204" pitchFamily="34" charset="0"/>
+                </a:defRPr>
+              </a:lvl1pPr>
+            </a:lstStyle>
+            <a:p>
+              <a:r>
+                <a:rPr lang="en-IN" sz="1600" i="1" dirty="0">
+                  <a:solidFill>
+                    <a:schemeClr val="accent1">
+                      <a:lumMod val="75000"/>
+                    </a:schemeClr>
+                  </a:solidFill>
+                </a:rPr>
+                <a:t>REST APIs, </a:t>
+              </a:r>
+              <a:r>
+                <a:rPr lang="en-IN" sz="1600" i="1" dirty="0" err="1">
+                  <a:solidFill>
+                    <a:schemeClr val="accent1">
+                      <a:lumMod val="75000"/>
+                    </a:schemeClr>
+                  </a:solidFill>
+                </a:rPr>
+                <a:t>GraphQL</a:t>
+              </a:r>
+              <a:r>
+                <a:rPr lang="en-IN" sz="1600" i="1" dirty="0">
+                  <a:solidFill>
+                    <a:schemeClr val="accent1">
+                      <a:lumMod val="75000"/>
+                    </a:schemeClr>
+                  </a:solidFill>
+                </a:rPr>
+                <a:t> (local, remote)</a:t>
+              </a:r>
+            </a:p>
+          </p:txBody>
+        </p:sp>
+        <p:pic>
+          <p:nvPicPr>
+            <p:cNvPr id="34" name="Picture 33">
+              <a:extLst>
+                <a:ext uri="{FF2B5EF4-FFF2-40B4-BE49-F238E27FC236}">
+                  <a16:creationId xmlns:a16="http://schemas.microsoft.com/office/drawing/2014/main" id="{97ED64E2-5158-4D7F-9C7E-1F095102CD47}"/>
+                </a:ext>
+              </a:extLst>
+            </p:cNvPr>
+            <p:cNvPicPr>
+              <a:picLocks noChangeAspect="1"/>
+            </p:cNvPicPr>
+            <p:nvPr/>
+          </p:nvPicPr>
+          <p:blipFill>
+            <a:blip r:embed="rId6"/>
+            <a:stretch>
+              <a:fillRect/>
+            </a:stretch>
+          </p:blipFill>
+          <p:spPr>
+            <a:xfrm>
+              <a:off x="9255439" y="5923019"/>
+              <a:ext cx="2339973" cy="861930"/>
+            </a:xfrm>
+            <a:prstGeom prst="rect">
+              <a:avLst/>
+            </a:prstGeom>
+          </p:spPr>
+        </p:pic>
+        <p:sp>
+          <p:nvSpPr>
+            <p:cNvPr id="51" name="TextBox 50">
+              <a:extLst>
+                <a:ext uri="{FF2B5EF4-FFF2-40B4-BE49-F238E27FC236}">
+                  <a16:creationId xmlns:a16="http://schemas.microsoft.com/office/drawing/2014/main" id="{91356C73-AB15-4128-A0DE-0C33104A0D2D}"/>
+                </a:ext>
+              </a:extLst>
+            </p:cNvPr>
+            <p:cNvSpPr txBox="1"/>
+            <p:nvPr/>
+          </p:nvSpPr>
+          <p:spPr>
+            <a:xfrm>
+              <a:off x="7063180" y="2286318"/>
+              <a:ext cx="2674240" cy="276999"/>
+            </a:xfrm>
+            <a:prstGeom prst="rect">
+              <a:avLst/>
+            </a:prstGeom>
+            <a:noFill/>
+          </p:spPr>
+          <p:txBody>
+            <a:bodyPr wrap="square" rtlCol="0">
+              <a:spAutoFit/>
+            </a:bodyPr>
+            <a:lstStyle>
+              <a:defPPr>
+                <a:defRPr lang="en-US"/>
+              </a:defPPr>
+              <a:lvl1pPr>
+                <a:defRPr>
+                  <a:latin typeface="Abadi Extra Light" panose="020B0204020104020204" pitchFamily="34" charset="0"/>
+                </a:defRPr>
+              </a:lvl1pPr>
+            </a:lstStyle>
+            <a:p>
+              <a:r>
+                <a:rPr lang="en-IN" sz="1200" dirty="0">
+                  <a:solidFill>
+                    <a:schemeClr val="bg2">
+                      <a:lumMod val="50000"/>
+                    </a:schemeClr>
+                  </a:solidFill>
+                </a:rPr>
+                <a:t>SAMPLE STRUCTURE</a:t>
+              </a:r>
+            </a:p>
+          </p:txBody>
+        </p:sp>
+      </p:grpSp>
+    </p:spTree>
+    <p:extLst>
+      <p:ext uri="{BB962C8B-B14F-4D97-AF65-F5344CB8AC3E}">
+        <p14:creationId xmlns:p14="http://schemas.microsoft.com/office/powerpoint/2010/main" val="932594343"/>
       </p:ext>
     </p:extLst>
   </p:cSld>

</xml_diff>